<commit_message>
workflow + R packages dependencies beschrieben
</commit_message>
<xml_diff>
--- a/images/dsBoltzmannMachinesOverview.pptx
+++ b/images/dsBoltzmannMachinesOverview.pptx
@@ -7,7 +7,7 @@
   <p:sldIdLst>
     <p:sldId id="256" r:id="rId2"/>
   </p:sldIdLst>
-  <p:sldSz cx="8640763" cy="5040313"/>
+  <p:sldSz cx="8640763" cy="6480175"/>
   <p:notesSz cx="6858000" cy="9144000"/>
   <p:defaultTextStyle>
     <a:defPPr>
@@ -104,6 +104,22 @@
       </a:defRPr>
     </a:lvl9pPr>
   </p:defaultTextStyle>
+  <p:extLst>
+    <p:ext uri="{EFAFB233-063F-42B5-8137-9DF3F51BA10A}">
+      <p15:sldGuideLst xmlns:p15="http://schemas.microsoft.com/office/powerpoint/2012/main">
+        <p15:guide id="1" orient="horz" pos="2041" userDrawn="1">
+          <p15:clr>
+            <a:srgbClr val="A4A3A4"/>
+          </p15:clr>
+        </p15:guide>
+        <p15:guide id="2" pos="2722" userDrawn="1">
+          <p15:clr>
+            <a:srgbClr val="A4A3A4"/>
+          </p15:clr>
+        </p15:guide>
+      </p15:sldGuideLst>
+    </p:ext>
+  </p:extLst>
 </p:presentation>
 </file>
 
@@ -136,8 +152,8 @@
         </p:nvSpPr>
         <p:spPr>
           <a:xfrm>
-            <a:off x="648057" y="1565765"/>
-            <a:ext cx="7344649" cy="1080400"/>
+            <a:off x="648065" y="2013056"/>
+            <a:ext cx="7344649" cy="1389038"/>
           </a:xfrm>
         </p:spPr>
         <p:txBody>
@@ -145,10 +161,9 @@
           <a:lstStyle/>
           <a:p>
             <a:r>
-              <a:rPr lang="de-DE" smtClean="0"/>
+              <a:rPr lang="de-DE"/>
               <a:t>Titelmasterformat durch Klicken bearbeiten</a:t>
             </a:r>
-            <a:endParaRPr lang="de-DE"/>
           </a:p>
         </p:txBody>
       </p:sp>
@@ -164,8 +179,8 @@
         </p:nvSpPr>
         <p:spPr>
           <a:xfrm>
-            <a:off x="1296115" y="2856177"/>
-            <a:ext cx="6048534" cy="1288080"/>
+            <a:off x="1296115" y="3672100"/>
+            <a:ext cx="6048534" cy="1656044"/>
           </a:xfrm>
         </p:spPr>
         <p:txBody>
@@ -181,7 +196,7 @@
                 </a:solidFill>
               </a:defRPr>
             </a:lvl1pPr>
-            <a:lvl2pPr marL="457200" indent="0" algn="ctr">
+            <a:lvl2pPr marL="783742" indent="0" algn="ctr">
               <a:buNone/>
               <a:defRPr>
                 <a:solidFill>
@@ -191,7 +206,7 @@
                 </a:solidFill>
               </a:defRPr>
             </a:lvl2pPr>
-            <a:lvl3pPr marL="914400" indent="0" algn="ctr">
+            <a:lvl3pPr marL="1567482" indent="0" algn="ctr">
               <a:buNone/>
               <a:defRPr>
                 <a:solidFill>
@@ -201,7 +216,7 @@
                 </a:solidFill>
               </a:defRPr>
             </a:lvl3pPr>
-            <a:lvl4pPr marL="1371600" indent="0" algn="ctr">
+            <a:lvl4pPr marL="2351222" indent="0" algn="ctr">
               <a:buNone/>
               <a:defRPr>
                 <a:solidFill>
@@ -211,7 +226,7 @@
                 </a:solidFill>
               </a:defRPr>
             </a:lvl4pPr>
-            <a:lvl5pPr marL="1828800" indent="0" algn="ctr">
+            <a:lvl5pPr marL="3134964" indent="0" algn="ctr">
               <a:buNone/>
               <a:defRPr>
                 <a:solidFill>
@@ -221,7 +236,7 @@
                 </a:solidFill>
               </a:defRPr>
             </a:lvl5pPr>
-            <a:lvl6pPr marL="2286000" indent="0" algn="ctr">
+            <a:lvl6pPr marL="3918705" indent="0" algn="ctr">
               <a:buNone/>
               <a:defRPr>
                 <a:solidFill>
@@ -231,7 +246,7 @@
                 </a:solidFill>
               </a:defRPr>
             </a:lvl6pPr>
-            <a:lvl7pPr marL="2743200" indent="0" algn="ctr">
+            <a:lvl7pPr marL="4702447" indent="0" algn="ctr">
               <a:buNone/>
               <a:defRPr>
                 <a:solidFill>
@@ -241,7 +256,7 @@
                 </a:solidFill>
               </a:defRPr>
             </a:lvl7pPr>
-            <a:lvl8pPr marL="3200400" indent="0" algn="ctr">
+            <a:lvl8pPr marL="5486187" indent="0" algn="ctr">
               <a:buNone/>
               <a:defRPr>
                 <a:solidFill>
@@ -251,7 +266,7 @@
                 </a:solidFill>
               </a:defRPr>
             </a:lvl8pPr>
-            <a:lvl9pPr marL="3657600" indent="0" algn="ctr">
+            <a:lvl9pPr marL="6269927" indent="0" algn="ctr">
               <a:buNone/>
               <a:defRPr>
                 <a:solidFill>
@@ -264,10 +279,9 @@
           </a:lstStyle>
           <a:p>
             <a:r>
-              <a:rPr lang="de-DE" smtClean="0"/>
+              <a:rPr lang="de-DE"/>
               <a:t>Formatvorlage des Untertitelmasters durch Klicken bearbeiten</a:t>
             </a:r>
-            <a:endParaRPr lang="de-DE"/>
           </a:p>
         </p:txBody>
       </p:sp>
@@ -288,7 +302,7 @@
           <a:p>
             <a:fld id="{5D1828FC-2644-49F9-9A30-4255A55091FC}" type="datetimeFigureOut">
               <a:rPr lang="de-DE" smtClean="0"/>
-              <a:t>12.08.2020</a:t>
+              <a:t>17.03.2021</a:t>
             </a:fld>
             <a:endParaRPr lang="de-DE"/>
           </a:p>
@@ -382,10 +396,9 @@
           <a:lstStyle/>
           <a:p>
             <a:r>
-              <a:rPr lang="de-DE" smtClean="0"/>
+              <a:rPr lang="de-DE"/>
               <a:t>Titelmasterformat durch Klicken bearbeiten</a:t>
             </a:r>
-            <a:endParaRPr lang="de-DE"/>
           </a:p>
         </p:txBody>
       </p:sp>
@@ -406,38 +419,37 @@
           <a:p>
             <a:pPr lvl="0"/>
             <a:r>
-              <a:rPr lang="de-DE" smtClean="0"/>
+              <a:rPr lang="de-DE"/>
               <a:t>Textmasterformat bearbeiten</a:t>
             </a:r>
           </a:p>
           <a:p>
             <a:pPr lvl="1"/>
             <a:r>
-              <a:rPr lang="de-DE" smtClean="0"/>
+              <a:rPr lang="de-DE"/>
               <a:t>Zweite Ebene</a:t>
             </a:r>
           </a:p>
           <a:p>
             <a:pPr lvl="2"/>
             <a:r>
-              <a:rPr lang="de-DE" smtClean="0"/>
+              <a:rPr lang="de-DE"/>
               <a:t>Dritte Ebene</a:t>
             </a:r>
           </a:p>
           <a:p>
             <a:pPr lvl="3"/>
             <a:r>
-              <a:rPr lang="de-DE" smtClean="0"/>
+              <a:rPr lang="de-DE"/>
               <a:t>Vierte Ebene</a:t>
             </a:r>
           </a:p>
           <a:p>
             <a:pPr lvl="4"/>
             <a:r>
-              <a:rPr lang="de-DE" smtClean="0"/>
+              <a:rPr lang="de-DE"/>
               <a:t>Fünfte Ebene</a:t>
             </a:r>
-            <a:endParaRPr lang="de-DE"/>
           </a:p>
         </p:txBody>
       </p:sp>
@@ -458,7 +470,7 @@
           <a:p>
             <a:fld id="{5D1828FC-2644-49F9-9A30-4255A55091FC}" type="datetimeFigureOut">
               <a:rPr lang="de-DE" smtClean="0"/>
-              <a:t>12.08.2020</a:t>
+              <a:t>17.03.2021</a:t>
             </a:fld>
             <a:endParaRPr lang="de-DE"/>
           </a:p>
@@ -548,8 +560,8 @@
         </p:nvSpPr>
         <p:spPr>
           <a:xfrm>
-            <a:off x="6264553" y="179680"/>
-            <a:ext cx="1944172" cy="3839739"/>
+            <a:off x="6264553" y="231013"/>
+            <a:ext cx="1944172" cy="4936633"/>
           </a:xfrm>
         </p:spPr>
         <p:txBody>
@@ -557,10 +569,9 @@
           <a:lstStyle/>
           <a:p>
             <a:r>
-              <a:rPr lang="de-DE" smtClean="0"/>
+              <a:rPr lang="de-DE"/>
               <a:t>Titelmasterformat durch Klicken bearbeiten</a:t>
             </a:r>
-            <a:endParaRPr lang="de-DE"/>
           </a:p>
         </p:txBody>
       </p:sp>
@@ -576,8 +587,8 @@
         </p:nvSpPr>
         <p:spPr>
           <a:xfrm>
-            <a:off x="432038" y="179680"/>
-            <a:ext cx="5688502" cy="3839739"/>
+            <a:off x="432038" y="231013"/>
+            <a:ext cx="5688502" cy="4936633"/>
           </a:xfrm>
         </p:spPr>
         <p:txBody>
@@ -586,38 +597,37 @@
           <a:p>
             <a:pPr lvl="0"/>
             <a:r>
-              <a:rPr lang="de-DE" smtClean="0"/>
+              <a:rPr lang="de-DE"/>
               <a:t>Textmasterformat bearbeiten</a:t>
             </a:r>
           </a:p>
           <a:p>
             <a:pPr lvl="1"/>
             <a:r>
-              <a:rPr lang="de-DE" smtClean="0"/>
+              <a:rPr lang="de-DE"/>
               <a:t>Zweite Ebene</a:t>
             </a:r>
           </a:p>
           <a:p>
             <a:pPr lvl="2"/>
             <a:r>
-              <a:rPr lang="de-DE" smtClean="0"/>
+              <a:rPr lang="de-DE"/>
               <a:t>Dritte Ebene</a:t>
             </a:r>
           </a:p>
           <a:p>
             <a:pPr lvl="3"/>
             <a:r>
-              <a:rPr lang="de-DE" smtClean="0"/>
+              <a:rPr lang="de-DE"/>
               <a:t>Vierte Ebene</a:t>
             </a:r>
           </a:p>
           <a:p>
             <a:pPr lvl="4"/>
             <a:r>
-              <a:rPr lang="de-DE" smtClean="0"/>
+              <a:rPr lang="de-DE"/>
               <a:t>Fünfte Ebene</a:t>
             </a:r>
-            <a:endParaRPr lang="de-DE"/>
           </a:p>
         </p:txBody>
       </p:sp>
@@ -638,7 +648,7 @@
           <a:p>
             <a:fld id="{5D1828FC-2644-49F9-9A30-4255A55091FC}" type="datetimeFigureOut">
               <a:rPr lang="de-DE" smtClean="0"/>
-              <a:t>12.08.2020</a:t>
+              <a:t>17.03.2021</a:t>
             </a:fld>
             <a:endParaRPr lang="de-DE"/>
           </a:p>
@@ -732,10 +742,9 @@
           <a:lstStyle/>
           <a:p>
             <a:r>
-              <a:rPr lang="de-DE" smtClean="0"/>
+              <a:rPr lang="de-DE"/>
               <a:t>Titelmasterformat durch Klicken bearbeiten</a:t>
             </a:r>
-            <a:endParaRPr lang="de-DE"/>
           </a:p>
         </p:txBody>
       </p:sp>
@@ -756,38 +765,37 @@
           <a:p>
             <a:pPr lvl="0"/>
             <a:r>
-              <a:rPr lang="de-DE" smtClean="0"/>
+              <a:rPr lang="de-DE"/>
               <a:t>Textmasterformat bearbeiten</a:t>
             </a:r>
           </a:p>
           <a:p>
             <a:pPr lvl="1"/>
             <a:r>
-              <a:rPr lang="de-DE" smtClean="0"/>
+              <a:rPr lang="de-DE"/>
               <a:t>Zweite Ebene</a:t>
             </a:r>
           </a:p>
           <a:p>
             <a:pPr lvl="2"/>
             <a:r>
-              <a:rPr lang="de-DE" smtClean="0"/>
+              <a:rPr lang="de-DE"/>
               <a:t>Dritte Ebene</a:t>
             </a:r>
           </a:p>
           <a:p>
             <a:pPr lvl="3"/>
             <a:r>
-              <a:rPr lang="de-DE" smtClean="0"/>
+              <a:rPr lang="de-DE"/>
               <a:t>Vierte Ebene</a:t>
             </a:r>
           </a:p>
           <a:p>
             <a:pPr lvl="4"/>
             <a:r>
-              <a:rPr lang="de-DE" smtClean="0"/>
+              <a:rPr lang="de-DE"/>
               <a:t>Fünfte Ebene</a:t>
             </a:r>
-            <a:endParaRPr lang="de-DE"/>
           </a:p>
         </p:txBody>
       </p:sp>
@@ -808,7 +816,7 @@
           <a:p>
             <a:fld id="{5D1828FC-2644-49F9-9A30-4255A55091FC}" type="datetimeFigureOut">
               <a:rPr lang="de-DE" smtClean="0"/>
-              <a:t>12.08.2020</a:t>
+              <a:t>17.03.2021</a:t>
             </a:fld>
             <a:endParaRPr lang="de-DE"/>
           </a:p>
@@ -898,23 +906,22 @@
         </p:nvSpPr>
         <p:spPr>
           <a:xfrm>
-            <a:off x="682561" y="3238868"/>
-            <a:ext cx="7344649" cy="1001062"/>
+            <a:off x="682569" y="4164114"/>
+            <a:ext cx="7344649" cy="1287034"/>
           </a:xfrm>
         </p:spPr>
         <p:txBody>
           <a:bodyPr anchor="t"/>
           <a:lstStyle>
             <a:lvl1pPr algn="l">
-              <a:defRPr sz="4000" b="1" cap="all"/>
+              <a:defRPr sz="6857" b="1" cap="all"/>
             </a:lvl1pPr>
           </a:lstStyle>
           <a:p>
             <a:r>
-              <a:rPr lang="de-DE" smtClean="0"/>
+              <a:rPr lang="de-DE"/>
               <a:t>Titelmasterformat durch Klicken bearbeiten</a:t>
             </a:r>
-            <a:endParaRPr lang="de-DE"/>
           </a:p>
         </p:txBody>
       </p:sp>
@@ -930,8 +937,8 @@
         </p:nvSpPr>
         <p:spPr>
           <a:xfrm>
-            <a:off x="682561" y="2136300"/>
-            <a:ext cx="7344649" cy="1102568"/>
+            <a:off x="682569" y="2746576"/>
+            <a:ext cx="7344649" cy="1417538"/>
           </a:xfrm>
         </p:spPr>
         <p:txBody>
@@ -939,7 +946,7 @@
           <a:lstStyle>
             <a:lvl1pPr marL="0" indent="0">
               <a:buNone/>
-              <a:defRPr sz="2000">
+              <a:defRPr sz="3429">
                 <a:solidFill>
                   <a:schemeClr val="tx1">
                     <a:tint val="75000"/>
@@ -947,9 +954,9 @@
                 </a:solidFill>
               </a:defRPr>
             </a:lvl1pPr>
-            <a:lvl2pPr marL="457200" indent="0">
-              <a:buNone/>
-              <a:defRPr sz="1800">
+            <a:lvl2pPr marL="783742" indent="0">
+              <a:buNone/>
+              <a:defRPr sz="3086">
                 <a:solidFill>
                   <a:schemeClr val="tx1">
                     <a:tint val="75000"/>
@@ -957,9 +964,9 @@
                 </a:solidFill>
               </a:defRPr>
             </a:lvl2pPr>
-            <a:lvl3pPr marL="914400" indent="0">
-              <a:buNone/>
-              <a:defRPr sz="1600">
+            <a:lvl3pPr marL="1567482" indent="0">
+              <a:buNone/>
+              <a:defRPr sz="2743">
                 <a:solidFill>
                   <a:schemeClr val="tx1">
                     <a:tint val="75000"/>
@@ -967,9 +974,9 @@
                 </a:solidFill>
               </a:defRPr>
             </a:lvl3pPr>
-            <a:lvl4pPr marL="1371600" indent="0">
-              <a:buNone/>
-              <a:defRPr sz="1400">
+            <a:lvl4pPr marL="2351222" indent="0">
+              <a:buNone/>
+              <a:defRPr sz="2400">
                 <a:solidFill>
                   <a:schemeClr val="tx1">
                     <a:tint val="75000"/>
@@ -977,9 +984,9 @@
                 </a:solidFill>
               </a:defRPr>
             </a:lvl4pPr>
-            <a:lvl5pPr marL="1828800" indent="0">
-              <a:buNone/>
-              <a:defRPr sz="1400">
+            <a:lvl5pPr marL="3134964" indent="0">
+              <a:buNone/>
+              <a:defRPr sz="2400">
                 <a:solidFill>
                   <a:schemeClr val="tx1">
                     <a:tint val="75000"/>
@@ -987,9 +994,9 @@
                 </a:solidFill>
               </a:defRPr>
             </a:lvl5pPr>
-            <a:lvl6pPr marL="2286000" indent="0">
-              <a:buNone/>
-              <a:defRPr sz="1400">
+            <a:lvl6pPr marL="3918705" indent="0">
+              <a:buNone/>
+              <a:defRPr sz="2400">
                 <a:solidFill>
                   <a:schemeClr val="tx1">
                     <a:tint val="75000"/>
@@ -997,9 +1004,9 @@
                 </a:solidFill>
               </a:defRPr>
             </a:lvl6pPr>
-            <a:lvl7pPr marL="2743200" indent="0">
-              <a:buNone/>
-              <a:defRPr sz="1400">
+            <a:lvl7pPr marL="4702447" indent="0">
+              <a:buNone/>
+              <a:defRPr sz="2400">
                 <a:solidFill>
                   <a:schemeClr val="tx1">
                     <a:tint val="75000"/>
@@ -1007,9 +1014,9 @@
                 </a:solidFill>
               </a:defRPr>
             </a:lvl7pPr>
-            <a:lvl8pPr marL="3200400" indent="0">
-              <a:buNone/>
-              <a:defRPr sz="1400">
+            <a:lvl8pPr marL="5486187" indent="0">
+              <a:buNone/>
+              <a:defRPr sz="2400">
                 <a:solidFill>
                   <a:schemeClr val="tx1">
                     <a:tint val="75000"/>
@@ -1017,9 +1024,9 @@
                 </a:solidFill>
               </a:defRPr>
             </a:lvl8pPr>
-            <a:lvl9pPr marL="3657600" indent="0">
-              <a:buNone/>
-              <a:defRPr sz="1400">
+            <a:lvl9pPr marL="6269927" indent="0">
+              <a:buNone/>
+              <a:defRPr sz="2400">
                 <a:solidFill>
                   <a:schemeClr val="tx1">
                     <a:tint val="75000"/>
@@ -1031,7 +1038,7 @@
           <a:p>
             <a:pPr lvl="0"/>
             <a:r>
-              <a:rPr lang="de-DE" smtClean="0"/>
+              <a:rPr lang="de-DE"/>
               <a:t>Textmasterformat bearbeiten</a:t>
             </a:r>
           </a:p>
@@ -1054,7 +1061,7 @@
           <a:p>
             <a:fld id="{5D1828FC-2644-49F9-9A30-4255A55091FC}" type="datetimeFigureOut">
               <a:rPr lang="de-DE" smtClean="0"/>
-              <a:t>12.08.2020</a:t>
+              <a:t>17.03.2021</a:t>
             </a:fld>
             <a:endParaRPr lang="de-DE"/>
           </a:p>
@@ -1148,10 +1155,9 @@
           <a:lstStyle/>
           <a:p>
             <a:r>
-              <a:rPr lang="de-DE" smtClean="0"/>
+              <a:rPr lang="de-DE"/>
               <a:t>Titelmasterformat durch Klicken bearbeiten</a:t>
             </a:r>
-            <a:endParaRPr lang="de-DE"/>
           </a:p>
         </p:txBody>
       </p:sp>
@@ -1167,76 +1173,75 @@
         </p:nvSpPr>
         <p:spPr>
           <a:xfrm>
-            <a:off x="432038" y="1050065"/>
-            <a:ext cx="3816337" cy="2969352"/>
+            <a:off x="432040" y="1350039"/>
+            <a:ext cx="3816337" cy="3817604"/>
           </a:xfrm>
         </p:spPr>
         <p:txBody>
           <a:bodyPr/>
           <a:lstStyle>
             <a:lvl1pPr>
-              <a:defRPr sz="2800"/>
+              <a:defRPr sz="4800"/>
             </a:lvl1pPr>
             <a:lvl2pPr>
-              <a:defRPr sz="2400"/>
+              <a:defRPr sz="4114"/>
             </a:lvl2pPr>
             <a:lvl3pPr>
-              <a:defRPr sz="2000"/>
+              <a:defRPr sz="3429"/>
             </a:lvl3pPr>
             <a:lvl4pPr>
-              <a:defRPr sz="1800"/>
+              <a:defRPr sz="3086"/>
             </a:lvl4pPr>
             <a:lvl5pPr>
-              <a:defRPr sz="1800"/>
+              <a:defRPr sz="3086"/>
             </a:lvl5pPr>
             <a:lvl6pPr>
-              <a:defRPr sz="1800"/>
+              <a:defRPr sz="3086"/>
             </a:lvl6pPr>
             <a:lvl7pPr>
-              <a:defRPr sz="1800"/>
+              <a:defRPr sz="3086"/>
             </a:lvl7pPr>
             <a:lvl8pPr>
-              <a:defRPr sz="1800"/>
+              <a:defRPr sz="3086"/>
             </a:lvl8pPr>
             <a:lvl9pPr>
-              <a:defRPr sz="1800"/>
+              <a:defRPr sz="3086"/>
             </a:lvl9pPr>
           </a:lstStyle>
           <a:p>
             <a:pPr lvl="0"/>
             <a:r>
-              <a:rPr lang="de-DE" smtClean="0"/>
+              <a:rPr lang="de-DE"/>
               <a:t>Textmasterformat bearbeiten</a:t>
             </a:r>
           </a:p>
           <a:p>
             <a:pPr lvl="1"/>
             <a:r>
-              <a:rPr lang="de-DE" smtClean="0"/>
+              <a:rPr lang="de-DE"/>
               <a:t>Zweite Ebene</a:t>
             </a:r>
           </a:p>
           <a:p>
             <a:pPr lvl="2"/>
             <a:r>
-              <a:rPr lang="de-DE" smtClean="0"/>
+              <a:rPr lang="de-DE"/>
               <a:t>Dritte Ebene</a:t>
             </a:r>
           </a:p>
           <a:p>
             <a:pPr lvl="3"/>
             <a:r>
-              <a:rPr lang="de-DE" smtClean="0"/>
+              <a:rPr lang="de-DE"/>
               <a:t>Vierte Ebene</a:t>
             </a:r>
           </a:p>
           <a:p>
             <a:pPr lvl="4"/>
             <a:r>
-              <a:rPr lang="de-DE" smtClean="0"/>
+              <a:rPr lang="de-DE"/>
               <a:t>Fünfte Ebene</a:t>
             </a:r>
-            <a:endParaRPr lang="de-DE"/>
           </a:p>
         </p:txBody>
       </p:sp>
@@ -1252,76 +1257,75 @@
         </p:nvSpPr>
         <p:spPr>
           <a:xfrm>
-            <a:off x="4392388" y="1050065"/>
-            <a:ext cx="3816337" cy="2969352"/>
+            <a:off x="4392396" y="1350039"/>
+            <a:ext cx="3816337" cy="3817604"/>
           </a:xfrm>
         </p:spPr>
         <p:txBody>
           <a:bodyPr/>
           <a:lstStyle>
             <a:lvl1pPr>
-              <a:defRPr sz="2800"/>
+              <a:defRPr sz="4800"/>
             </a:lvl1pPr>
             <a:lvl2pPr>
-              <a:defRPr sz="2400"/>
+              <a:defRPr sz="4114"/>
             </a:lvl2pPr>
             <a:lvl3pPr>
-              <a:defRPr sz="2000"/>
+              <a:defRPr sz="3429"/>
             </a:lvl3pPr>
             <a:lvl4pPr>
-              <a:defRPr sz="1800"/>
+              <a:defRPr sz="3086"/>
             </a:lvl4pPr>
             <a:lvl5pPr>
-              <a:defRPr sz="1800"/>
+              <a:defRPr sz="3086"/>
             </a:lvl5pPr>
             <a:lvl6pPr>
-              <a:defRPr sz="1800"/>
+              <a:defRPr sz="3086"/>
             </a:lvl6pPr>
             <a:lvl7pPr>
-              <a:defRPr sz="1800"/>
+              <a:defRPr sz="3086"/>
             </a:lvl7pPr>
             <a:lvl8pPr>
-              <a:defRPr sz="1800"/>
+              <a:defRPr sz="3086"/>
             </a:lvl8pPr>
             <a:lvl9pPr>
-              <a:defRPr sz="1800"/>
+              <a:defRPr sz="3086"/>
             </a:lvl9pPr>
           </a:lstStyle>
           <a:p>
             <a:pPr lvl="0"/>
             <a:r>
-              <a:rPr lang="de-DE" smtClean="0"/>
+              <a:rPr lang="de-DE"/>
               <a:t>Textmasterformat bearbeiten</a:t>
             </a:r>
           </a:p>
           <a:p>
             <a:pPr lvl="1"/>
             <a:r>
-              <a:rPr lang="de-DE" smtClean="0"/>
+              <a:rPr lang="de-DE"/>
               <a:t>Zweite Ebene</a:t>
             </a:r>
           </a:p>
           <a:p>
             <a:pPr lvl="2"/>
             <a:r>
-              <a:rPr lang="de-DE" smtClean="0"/>
+              <a:rPr lang="de-DE"/>
               <a:t>Dritte Ebene</a:t>
             </a:r>
           </a:p>
           <a:p>
             <a:pPr lvl="3"/>
             <a:r>
-              <a:rPr lang="de-DE" smtClean="0"/>
+              <a:rPr lang="de-DE"/>
               <a:t>Vierte Ebene</a:t>
             </a:r>
           </a:p>
           <a:p>
             <a:pPr lvl="4"/>
             <a:r>
-              <a:rPr lang="de-DE" smtClean="0"/>
+              <a:rPr lang="de-DE"/>
               <a:t>Fünfte Ebene</a:t>
             </a:r>
-            <a:endParaRPr lang="de-DE"/>
           </a:p>
         </p:txBody>
       </p:sp>
@@ -1342,7 +1346,7 @@
           <a:p>
             <a:fld id="{5D1828FC-2644-49F9-9A30-4255A55091FC}" type="datetimeFigureOut">
               <a:rPr lang="de-DE" smtClean="0"/>
-              <a:t>12.08.2020</a:t>
+              <a:t>17.03.2021</a:t>
             </a:fld>
             <a:endParaRPr lang="de-DE"/>
           </a:p>
@@ -1432,8 +1436,8 @@
         </p:nvSpPr>
         <p:spPr>
           <a:xfrm>
-            <a:off x="432038" y="201847"/>
-            <a:ext cx="7776687" cy="840052"/>
+            <a:off x="432046" y="259510"/>
+            <a:ext cx="7776687" cy="1080029"/>
           </a:xfrm>
         </p:spPr>
         <p:txBody>
@@ -1445,10 +1449,9 @@
           </a:lstStyle>
           <a:p>
             <a:r>
-              <a:rPr lang="de-DE" smtClean="0"/>
+              <a:rPr lang="de-DE"/>
               <a:t>Titelmasterformat durch Klicken bearbeiten</a:t>
             </a:r>
-            <a:endParaRPr lang="de-DE"/>
           </a:p>
         </p:txBody>
       </p:sp>
@@ -1464,8 +1467,8 @@
         </p:nvSpPr>
         <p:spPr>
           <a:xfrm>
-            <a:off x="432038" y="1128237"/>
-            <a:ext cx="3817838" cy="470196"/>
+            <a:off x="432038" y="1450541"/>
+            <a:ext cx="3817838" cy="604516"/>
           </a:xfrm>
         </p:spPr>
         <p:txBody>
@@ -1473,45 +1476,45 @@
           <a:lstStyle>
             <a:lvl1pPr marL="0" indent="0">
               <a:buNone/>
-              <a:defRPr sz="2400" b="1"/>
+              <a:defRPr sz="4114" b="1"/>
             </a:lvl1pPr>
-            <a:lvl2pPr marL="457200" indent="0">
-              <a:buNone/>
-              <a:defRPr sz="2000" b="1"/>
+            <a:lvl2pPr marL="783742" indent="0">
+              <a:buNone/>
+              <a:defRPr sz="3429" b="1"/>
             </a:lvl2pPr>
-            <a:lvl3pPr marL="914400" indent="0">
-              <a:buNone/>
-              <a:defRPr sz="1800" b="1"/>
+            <a:lvl3pPr marL="1567482" indent="0">
+              <a:buNone/>
+              <a:defRPr sz="3086" b="1"/>
             </a:lvl3pPr>
-            <a:lvl4pPr marL="1371600" indent="0">
-              <a:buNone/>
-              <a:defRPr sz="1600" b="1"/>
+            <a:lvl4pPr marL="2351222" indent="0">
+              <a:buNone/>
+              <a:defRPr sz="2743" b="1"/>
             </a:lvl4pPr>
-            <a:lvl5pPr marL="1828800" indent="0">
-              <a:buNone/>
-              <a:defRPr sz="1600" b="1"/>
+            <a:lvl5pPr marL="3134964" indent="0">
+              <a:buNone/>
+              <a:defRPr sz="2743" b="1"/>
             </a:lvl5pPr>
-            <a:lvl6pPr marL="2286000" indent="0">
-              <a:buNone/>
-              <a:defRPr sz="1600" b="1"/>
+            <a:lvl6pPr marL="3918705" indent="0">
+              <a:buNone/>
+              <a:defRPr sz="2743" b="1"/>
             </a:lvl6pPr>
-            <a:lvl7pPr marL="2743200" indent="0">
-              <a:buNone/>
-              <a:defRPr sz="1600" b="1"/>
+            <a:lvl7pPr marL="4702447" indent="0">
+              <a:buNone/>
+              <a:defRPr sz="2743" b="1"/>
             </a:lvl7pPr>
-            <a:lvl8pPr marL="3200400" indent="0">
-              <a:buNone/>
-              <a:defRPr sz="1600" b="1"/>
+            <a:lvl8pPr marL="5486187" indent="0">
+              <a:buNone/>
+              <a:defRPr sz="2743" b="1"/>
             </a:lvl8pPr>
-            <a:lvl9pPr marL="3657600" indent="0">
-              <a:buNone/>
-              <a:defRPr sz="1600" b="1"/>
+            <a:lvl9pPr marL="6269927" indent="0">
+              <a:buNone/>
+              <a:defRPr sz="2743" b="1"/>
             </a:lvl9pPr>
           </a:lstStyle>
           <a:p>
             <a:pPr lvl="0"/>
             <a:r>
-              <a:rPr lang="de-DE" smtClean="0"/>
+              <a:rPr lang="de-DE"/>
               <a:t>Textmasterformat bearbeiten</a:t>
             </a:r>
           </a:p>
@@ -1529,76 +1532,75 @@
         </p:nvSpPr>
         <p:spPr>
           <a:xfrm>
-            <a:off x="432038" y="1598433"/>
-            <a:ext cx="3817838" cy="2904014"/>
+            <a:off x="432038" y="2055057"/>
+            <a:ext cx="3817838" cy="3733601"/>
           </a:xfrm>
         </p:spPr>
         <p:txBody>
           <a:bodyPr/>
           <a:lstStyle>
             <a:lvl1pPr>
-              <a:defRPr sz="2400"/>
+              <a:defRPr sz="4114"/>
             </a:lvl1pPr>
             <a:lvl2pPr>
-              <a:defRPr sz="2000"/>
+              <a:defRPr sz="3429"/>
             </a:lvl2pPr>
             <a:lvl3pPr>
-              <a:defRPr sz="1800"/>
+              <a:defRPr sz="3086"/>
             </a:lvl3pPr>
             <a:lvl4pPr>
-              <a:defRPr sz="1600"/>
+              <a:defRPr sz="2743"/>
             </a:lvl4pPr>
             <a:lvl5pPr>
-              <a:defRPr sz="1600"/>
+              <a:defRPr sz="2743"/>
             </a:lvl5pPr>
             <a:lvl6pPr>
-              <a:defRPr sz="1600"/>
+              <a:defRPr sz="2743"/>
             </a:lvl6pPr>
             <a:lvl7pPr>
-              <a:defRPr sz="1600"/>
+              <a:defRPr sz="2743"/>
             </a:lvl7pPr>
             <a:lvl8pPr>
-              <a:defRPr sz="1600"/>
+              <a:defRPr sz="2743"/>
             </a:lvl8pPr>
             <a:lvl9pPr>
-              <a:defRPr sz="1600"/>
+              <a:defRPr sz="2743"/>
             </a:lvl9pPr>
           </a:lstStyle>
           <a:p>
             <a:pPr lvl="0"/>
             <a:r>
-              <a:rPr lang="de-DE" smtClean="0"/>
+              <a:rPr lang="de-DE"/>
               <a:t>Textmasterformat bearbeiten</a:t>
             </a:r>
           </a:p>
           <a:p>
             <a:pPr lvl="1"/>
             <a:r>
-              <a:rPr lang="de-DE" smtClean="0"/>
+              <a:rPr lang="de-DE"/>
               <a:t>Zweite Ebene</a:t>
             </a:r>
           </a:p>
           <a:p>
             <a:pPr lvl="2"/>
             <a:r>
-              <a:rPr lang="de-DE" smtClean="0"/>
+              <a:rPr lang="de-DE"/>
               <a:t>Dritte Ebene</a:t>
             </a:r>
           </a:p>
           <a:p>
             <a:pPr lvl="3"/>
             <a:r>
-              <a:rPr lang="de-DE" smtClean="0"/>
+              <a:rPr lang="de-DE"/>
               <a:t>Vierte Ebene</a:t>
             </a:r>
           </a:p>
           <a:p>
             <a:pPr lvl="4"/>
             <a:r>
-              <a:rPr lang="de-DE" smtClean="0"/>
+              <a:rPr lang="de-DE"/>
               <a:t>Fünfte Ebene</a:t>
             </a:r>
-            <a:endParaRPr lang="de-DE"/>
           </a:p>
         </p:txBody>
       </p:sp>
@@ -1614,8 +1616,8 @@
         </p:nvSpPr>
         <p:spPr>
           <a:xfrm>
-            <a:off x="4389390" y="1128237"/>
-            <a:ext cx="3819337" cy="470196"/>
+            <a:off x="4389398" y="1450541"/>
+            <a:ext cx="3819337" cy="604516"/>
           </a:xfrm>
         </p:spPr>
         <p:txBody>
@@ -1623,45 +1625,45 @@
           <a:lstStyle>
             <a:lvl1pPr marL="0" indent="0">
               <a:buNone/>
-              <a:defRPr sz="2400" b="1"/>
+              <a:defRPr sz="4114" b="1"/>
             </a:lvl1pPr>
-            <a:lvl2pPr marL="457200" indent="0">
-              <a:buNone/>
-              <a:defRPr sz="2000" b="1"/>
+            <a:lvl2pPr marL="783742" indent="0">
+              <a:buNone/>
+              <a:defRPr sz="3429" b="1"/>
             </a:lvl2pPr>
-            <a:lvl3pPr marL="914400" indent="0">
-              <a:buNone/>
-              <a:defRPr sz="1800" b="1"/>
+            <a:lvl3pPr marL="1567482" indent="0">
+              <a:buNone/>
+              <a:defRPr sz="3086" b="1"/>
             </a:lvl3pPr>
-            <a:lvl4pPr marL="1371600" indent="0">
-              <a:buNone/>
-              <a:defRPr sz="1600" b="1"/>
+            <a:lvl4pPr marL="2351222" indent="0">
+              <a:buNone/>
+              <a:defRPr sz="2743" b="1"/>
             </a:lvl4pPr>
-            <a:lvl5pPr marL="1828800" indent="0">
-              <a:buNone/>
-              <a:defRPr sz="1600" b="1"/>
+            <a:lvl5pPr marL="3134964" indent="0">
+              <a:buNone/>
+              <a:defRPr sz="2743" b="1"/>
             </a:lvl5pPr>
-            <a:lvl6pPr marL="2286000" indent="0">
-              <a:buNone/>
-              <a:defRPr sz="1600" b="1"/>
+            <a:lvl6pPr marL="3918705" indent="0">
+              <a:buNone/>
+              <a:defRPr sz="2743" b="1"/>
             </a:lvl6pPr>
-            <a:lvl7pPr marL="2743200" indent="0">
-              <a:buNone/>
-              <a:defRPr sz="1600" b="1"/>
+            <a:lvl7pPr marL="4702447" indent="0">
+              <a:buNone/>
+              <a:defRPr sz="2743" b="1"/>
             </a:lvl7pPr>
-            <a:lvl8pPr marL="3200400" indent="0">
-              <a:buNone/>
-              <a:defRPr sz="1600" b="1"/>
+            <a:lvl8pPr marL="5486187" indent="0">
+              <a:buNone/>
+              <a:defRPr sz="2743" b="1"/>
             </a:lvl8pPr>
-            <a:lvl9pPr marL="3657600" indent="0">
-              <a:buNone/>
-              <a:defRPr sz="1600" b="1"/>
+            <a:lvl9pPr marL="6269927" indent="0">
+              <a:buNone/>
+              <a:defRPr sz="2743" b="1"/>
             </a:lvl9pPr>
           </a:lstStyle>
           <a:p>
             <a:pPr lvl="0"/>
             <a:r>
-              <a:rPr lang="de-DE" smtClean="0"/>
+              <a:rPr lang="de-DE"/>
               <a:t>Textmasterformat bearbeiten</a:t>
             </a:r>
           </a:p>
@@ -1679,76 +1681,75 @@
         </p:nvSpPr>
         <p:spPr>
           <a:xfrm>
-            <a:off x="4389390" y="1598433"/>
-            <a:ext cx="3819337" cy="2904014"/>
+            <a:off x="4389398" y="2055057"/>
+            <a:ext cx="3819337" cy="3733601"/>
           </a:xfrm>
         </p:spPr>
         <p:txBody>
           <a:bodyPr/>
           <a:lstStyle>
             <a:lvl1pPr>
-              <a:defRPr sz="2400"/>
+              <a:defRPr sz="4114"/>
             </a:lvl1pPr>
             <a:lvl2pPr>
-              <a:defRPr sz="2000"/>
+              <a:defRPr sz="3429"/>
             </a:lvl2pPr>
             <a:lvl3pPr>
-              <a:defRPr sz="1800"/>
+              <a:defRPr sz="3086"/>
             </a:lvl3pPr>
             <a:lvl4pPr>
-              <a:defRPr sz="1600"/>
+              <a:defRPr sz="2743"/>
             </a:lvl4pPr>
             <a:lvl5pPr>
-              <a:defRPr sz="1600"/>
+              <a:defRPr sz="2743"/>
             </a:lvl5pPr>
             <a:lvl6pPr>
-              <a:defRPr sz="1600"/>
+              <a:defRPr sz="2743"/>
             </a:lvl6pPr>
             <a:lvl7pPr>
-              <a:defRPr sz="1600"/>
+              <a:defRPr sz="2743"/>
             </a:lvl7pPr>
             <a:lvl8pPr>
-              <a:defRPr sz="1600"/>
+              <a:defRPr sz="2743"/>
             </a:lvl8pPr>
             <a:lvl9pPr>
-              <a:defRPr sz="1600"/>
+              <a:defRPr sz="2743"/>
             </a:lvl9pPr>
           </a:lstStyle>
           <a:p>
             <a:pPr lvl="0"/>
             <a:r>
-              <a:rPr lang="de-DE" smtClean="0"/>
+              <a:rPr lang="de-DE"/>
               <a:t>Textmasterformat bearbeiten</a:t>
             </a:r>
           </a:p>
           <a:p>
             <a:pPr lvl="1"/>
             <a:r>
-              <a:rPr lang="de-DE" smtClean="0"/>
+              <a:rPr lang="de-DE"/>
               <a:t>Zweite Ebene</a:t>
             </a:r>
           </a:p>
           <a:p>
             <a:pPr lvl="2"/>
             <a:r>
-              <a:rPr lang="de-DE" smtClean="0"/>
+              <a:rPr lang="de-DE"/>
               <a:t>Dritte Ebene</a:t>
             </a:r>
           </a:p>
           <a:p>
             <a:pPr lvl="3"/>
             <a:r>
-              <a:rPr lang="de-DE" smtClean="0"/>
+              <a:rPr lang="de-DE"/>
               <a:t>Vierte Ebene</a:t>
             </a:r>
           </a:p>
           <a:p>
             <a:pPr lvl="4"/>
             <a:r>
-              <a:rPr lang="de-DE" smtClean="0"/>
+              <a:rPr lang="de-DE"/>
               <a:t>Fünfte Ebene</a:t>
             </a:r>
-            <a:endParaRPr lang="de-DE"/>
           </a:p>
         </p:txBody>
       </p:sp>
@@ -1769,7 +1770,7 @@
           <a:p>
             <a:fld id="{5D1828FC-2644-49F9-9A30-4255A55091FC}" type="datetimeFigureOut">
               <a:rPr lang="de-DE" smtClean="0"/>
-              <a:t>12.08.2020</a:t>
+              <a:t>17.03.2021</a:t>
             </a:fld>
             <a:endParaRPr lang="de-DE"/>
           </a:p>
@@ -1863,10 +1864,9 @@
           <a:lstStyle/>
           <a:p>
             <a:r>
-              <a:rPr lang="de-DE" smtClean="0"/>
+              <a:rPr lang="de-DE"/>
               <a:t>Titelmasterformat durch Klicken bearbeiten</a:t>
             </a:r>
-            <a:endParaRPr lang="de-DE"/>
           </a:p>
         </p:txBody>
       </p:sp>
@@ -1887,7 +1887,7 @@
           <a:p>
             <a:fld id="{5D1828FC-2644-49F9-9A30-4255A55091FC}" type="datetimeFigureOut">
               <a:rPr lang="de-DE" smtClean="0"/>
-              <a:t>12.08.2020</a:t>
+              <a:t>17.03.2021</a:t>
             </a:fld>
             <a:endParaRPr lang="de-DE"/>
           </a:p>
@@ -1982,7 +1982,7 @@
           <a:p>
             <a:fld id="{5D1828FC-2644-49F9-9A30-4255A55091FC}" type="datetimeFigureOut">
               <a:rPr lang="de-DE" smtClean="0"/>
-              <a:t>12.08.2020</a:t>
+              <a:t>17.03.2021</a:t>
             </a:fld>
             <a:endParaRPr lang="de-DE"/>
           </a:p>
@@ -2072,23 +2072,22 @@
         </p:nvSpPr>
         <p:spPr>
           <a:xfrm>
-            <a:off x="432041" y="200681"/>
-            <a:ext cx="2842751" cy="854053"/>
+            <a:off x="432049" y="258012"/>
+            <a:ext cx="2842751" cy="1098030"/>
           </a:xfrm>
         </p:spPr>
         <p:txBody>
           <a:bodyPr anchor="b"/>
           <a:lstStyle>
             <a:lvl1pPr algn="l">
-              <a:defRPr sz="2000" b="1"/>
+              <a:defRPr sz="3429" b="1"/>
             </a:lvl1pPr>
           </a:lstStyle>
           <a:p>
             <a:r>
-              <a:rPr lang="de-DE" smtClean="0"/>
+              <a:rPr lang="de-DE"/>
               <a:t>Titelmasterformat durch Klicken bearbeiten</a:t>
             </a:r>
-            <a:endParaRPr lang="de-DE"/>
           </a:p>
         </p:txBody>
       </p:sp>
@@ -2104,76 +2103,75 @@
         </p:nvSpPr>
         <p:spPr>
           <a:xfrm>
-            <a:off x="3378298" y="200681"/>
-            <a:ext cx="4830427" cy="4301767"/>
+            <a:off x="3378306" y="258013"/>
+            <a:ext cx="4830427" cy="5530649"/>
           </a:xfrm>
         </p:spPr>
         <p:txBody>
           <a:bodyPr/>
           <a:lstStyle>
             <a:lvl1pPr>
-              <a:defRPr sz="3200"/>
+              <a:defRPr sz="5486"/>
             </a:lvl1pPr>
             <a:lvl2pPr>
-              <a:defRPr sz="2800"/>
+              <a:defRPr sz="4800"/>
             </a:lvl2pPr>
             <a:lvl3pPr>
-              <a:defRPr sz="2400"/>
+              <a:defRPr sz="4114"/>
             </a:lvl3pPr>
             <a:lvl4pPr>
-              <a:defRPr sz="2000"/>
+              <a:defRPr sz="3429"/>
             </a:lvl4pPr>
             <a:lvl5pPr>
-              <a:defRPr sz="2000"/>
+              <a:defRPr sz="3429"/>
             </a:lvl5pPr>
             <a:lvl6pPr>
-              <a:defRPr sz="2000"/>
+              <a:defRPr sz="3429"/>
             </a:lvl6pPr>
             <a:lvl7pPr>
-              <a:defRPr sz="2000"/>
+              <a:defRPr sz="3429"/>
             </a:lvl7pPr>
             <a:lvl8pPr>
-              <a:defRPr sz="2000"/>
+              <a:defRPr sz="3429"/>
             </a:lvl8pPr>
             <a:lvl9pPr>
-              <a:defRPr sz="2000"/>
+              <a:defRPr sz="3429"/>
             </a:lvl9pPr>
           </a:lstStyle>
           <a:p>
             <a:pPr lvl="0"/>
             <a:r>
-              <a:rPr lang="de-DE" smtClean="0"/>
+              <a:rPr lang="de-DE"/>
               <a:t>Textmasterformat bearbeiten</a:t>
             </a:r>
           </a:p>
           <a:p>
             <a:pPr lvl="1"/>
             <a:r>
-              <a:rPr lang="de-DE" smtClean="0"/>
+              <a:rPr lang="de-DE"/>
               <a:t>Zweite Ebene</a:t>
             </a:r>
           </a:p>
           <a:p>
             <a:pPr lvl="2"/>
             <a:r>
-              <a:rPr lang="de-DE" smtClean="0"/>
+              <a:rPr lang="de-DE"/>
               <a:t>Dritte Ebene</a:t>
             </a:r>
           </a:p>
           <a:p>
             <a:pPr lvl="3"/>
             <a:r>
-              <a:rPr lang="de-DE" smtClean="0"/>
+              <a:rPr lang="de-DE"/>
               <a:t>Vierte Ebene</a:t>
             </a:r>
           </a:p>
           <a:p>
             <a:pPr lvl="4"/>
             <a:r>
-              <a:rPr lang="de-DE" smtClean="0"/>
+              <a:rPr lang="de-DE"/>
               <a:t>Fünfte Ebene</a:t>
             </a:r>
-            <a:endParaRPr lang="de-DE"/>
           </a:p>
         </p:txBody>
       </p:sp>
@@ -2189,8 +2187,8 @@
         </p:nvSpPr>
         <p:spPr>
           <a:xfrm>
-            <a:off x="432041" y="1054733"/>
-            <a:ext cx="2842751" cy="3447714"/>
+            <a:off x="432049" y="1356037"/>
+            <a:ext cx="2842751" cy="4432620"/>
           </a:xfrm>
         </p:spPr>
         <p:txBody>
@@ -2198,45 +2196,45 @@
           <a:lstStyle>
             <a:lvl1pPr marL="0" indent="0">
               <a:buNone/>
-              <a:defRPr sz="1400"/>
+              <a:defRPr sz="2400"/>
             </a:lvl1pPr>
-            <a:lvl2pPr marL="457200" indent="0">
-              <a:buNone/>
-              <a:defRPr sz="1200"/>
+            <a:lvl2pPr marL="783742" indent="0">
+              <a:buNone/>
+              <a:defRPr sz="2057"/>
             </a:lvl2pPr>
-            <a:lvl3pPr marL="914400" indent="0">
-              <a:buNone/>
-              <a:defRPr sz="1000"/>
+            <a:lvl3pPr marL="1567482" indent="0">
+              <a:buNone/>
+              <a:defRPr sz="1714"/>
             </a:lvl3pPr>
-            <a:lvl4pPr marL="1371600" indent="0">
-              <a:buNone/>
-              <a:defRPr sz="900"/>
+            <a:lvl4pPr marL="2351222" indent="0">
+              <a:buNone/>
+              <a:defRPr sz="1543"/>
             </a:lvl4pPr>
-            <a:lvl5pPr marL="1828800" indent="0">
-              <a:buNone/>
-              <a:defRPr sz="900"/>
+            <a:lvl5pPr marL="3134964" indent="0">
+              <a:buNone/>
+              <a:defRPr sz="1543"/>
             </a:lvl5pPr>
-            <a:lvl6pPr marL="2286000" indent="0">
-              <a:buNone/>
-              <a:defRPr sz="900"/>
+            <a:lvl6pPr marL="3918705" indent="0">
+              <a:buNone/>
+              <a:defRPr sz="1543"/>
             </a:lvl6pPr>
-            <a:lvl7pPr marL="2743200" indent="0">
-              <a:buNone/>
-              <a:defRPr sz="900"/>
+            <a:lvl7pPr marL="4702447" indent="0">
+              <a:buNone/>
+              <a:defRPr sz="1543"/>
             </a:lvl7pPr>
-            <a:lvl8pPr marL="3200400" indent="0">
-              <a:buNone/>
-              <a:defRPr sz="900"/>
+            <a:lvl8pPr marL="5486187" indent="0">
+              <a:buNone/>
+              <a:defRPr sz="1543"/>
             </a:lvl8pPr>
-            <a:lvl9pPr marL="3657600" indent="0">
-              <a:buNone/>
-              <a:defRPr sz="900"/>
+            <a:lvl9pPr marL="6269927" indent="0">
+              <a:buNone/>
+              <a:defRPr sz="1543"/>
             </a:lvl9pPr>
           </a:lstStyle>
           <a:p>
             <a:pPr lvl="0"/>
             <a:r>
-              <a:rPr lang="de-DE" smtClean="0"/>
+              <a:rPr lang="de-DE"/>
               <a:t>Textmasterformat bearbeiten</a:t>
             </a:r>
           </a:p>
@@ -2259,7 +2257,7 @@
           <a:p>
             <a:fld id="{5D1828FC-2644-49F9-9A30-4255A55091FC}" type="datetimeFigureOut">
               <a:rPr lang="de-DE" smtClean="0"/>
-              <a:t>12.08.2020</a:t>
+              <a:t>17.03.2021</a:t>
             </a:fld>
             <a:endParaRPr lang="de-DE"/>
           </a:p>
@@ -2349,23 +2347,22 @@
         </p:nvSpPr>
         <p:spPr>
           <a:xfrm>
-            <a:off x="1693650" y="3528219"/>
-            <a:ext cx="5184458" cy="416526"/>
+            <a:off x="1693650" y="4536123"/>
+            <a:ext cx="5184458" cy="535514"/>
           </a:xfrm>
         </p:spPr>
         <p:txBody>
           <a:bodyPr anchor="b"/>
           <a:lstStyle>
             <a:lvl1pPr algn="l">
-              <a:defRPr sz="2000" b="1"/>
+              <a:defRPr sz="3429" b="1"/>
             </a:lvl1pPr>
           </a:lstStyle>
           <a:p>
             <a:r>
-              <a:rPr lang="de-DE" smtClean="0"/>
+              <a:rPr lang="de-DE"/>
               <a:t>Titelmasterformat durch Klicken bearbeiten</a:t>
             </a:r>
-            <a:endParaRPr lang="de-DE"/>
           </a:p>
         </p:txBody>
       </p:sp>
@@ -2381,8 +2378,8 @@
         </p:nvSpPr>
         <p:spPr>
           <a:xfrm>
-            <a:off x="1693650" y="450361"/>
-            <a:ext cx="5184458" cy="3024188"/>
+            <a:off x="1693650" y="579016"/>
+            <a:ext cx="5184458" cy="3888105"/>
           </a:xfrm>
         </p:spPr>
         <p:txBody>
@@ -2390,39 +2387,39 @@
           <a:lstStyle>
             <a:lvl1pPr marL="0" indent="0">
               <a:buNone/>
-              <a:defRPr sz="3200"/>
+              <a:defRPr sz="5486"/>
             </a:lvl1pPr>
-            <a:lvl2pPr marL="457200" indent="0">
-              <a:buNone/>
-              <a:defRPr sz="2800"/>
+            <a:lvl2pPr marL="783742" indent="0">
+              <a:buNone/>
+              <a:defRPr sz="4800"/>
             </a:lvl2pPr>
-            <a:lvl3pPr marL="914400" indent="0">
-              <a:buNone/>
-              <a:defRPr sz="2400"/>
+            <a:lvl3pPr marL="1567482" indent="0">
+              <a:buNone/>
+              <a:defRPr sz="4114"/>
             </a:lvl3pPr>
-            <a:lvl4pPr marL="1371600" indent="0">
-              <a:buNone/>
-              <a:defRPr sz="2000"/>
+            <a:lvl4pPr marL="2351222" indent="0">
+              <a:buNone/>
+              <a:defRPr sz="3429"/>
             </a:lvl4pPr>
-            <a:lvl5pPr marL="1828800" indent="0">
-              <a:buNone/>
-              <a:defRPr sz="2000"/>
+            <a:lvl5pPr marL="3134964" indent="0">
+              <a:buNone/>
+              <a:defRPr sz="3429"/>
             </a:lvl5pPr>
-            <a:lvl6pPr marL="2286000" indent="0">
-              <a:buNone/>
-              <a:defRPr sz="2000"/>
+            <a:lvl6pPr marL="3918705" indent="0">
+              <a:buNone/>
+              <a:defRPr sz="3429"/>
             </a:lvl6pPr>
-            <a:lvl7pPr marL="2743200" indent="0">
-              <a:buNone/>
-              <a:defRPr sz="2000"/>
+            <a:lvl7pPr marL="4702447" indent="0">
+              <a:buNone/>
+              <a:defRPr sz="3429"/>
             </a:lvl7pPr>
-            <a:lvl8pPr marL="3200400" indent="0">
-              <a:buNone/>
-              <a:defRPr sz="2000"/>
+            <a:lvl8pPr marL="5486187" indent="0">
+              <a:buNone/>
+              <a:defRPr sz="3429"/>
             </a:lvl8pPr>
-            <a:lvl9pPr marL="3657600" indent="0">
-              <a:buNone/>
-              <a:defRPr sz="2000"/>
+            <a:lvl9pPr marL="6269927" indent="0">
+              <a:buNone/>
+              <a:defRPr sz="3429"/>
             </a:lvl9pPr>
           </a:lstStyle>
           <a:p>
@@ -2442,8 +2439,8 @@
         </p:nvSpPr>
         <p:spPr>
           <a:xfrm>
-            <a:off x="1693650" y="3944745"/>
-            <a:ext cx="5184458" cy="591536"/>
+            <a:off x="1693650" y="5071637"/>
+            <a:ext cx="5184458" cy="760519"/>
           </a:xfrm>
         </p:spPr>
         <p:txBody>
@@ -2451,45 +2448,45 @@
           <a:lstStyle>
             <a:lvl1pPr marL="0" indent="0">
               <a:buNone/>
-              <a:defRPr sz="1400"/>
+              <a:defRPr sz="2400"/>
             </a:lvl1pPr>
-            <a:lvl2pPr marL="457200" indent="0">
-              <a:buNone/>
-              <a:defRPr sz="1200"/>
+            <a:lvl2pPr marL="783742" indent="0">
+              <a:buNone/>
+              <a:defRPr sz="2057"/>
             </a:lvl2pPr>
-            <a:lvl3pPr marL="914400" indent="0">
-              <a:buNone/>
-              <a:defRPr sz="1000"/>
+            <a:lvl3pPr marL="1567482" indent="0">
+              <a:buNone/>
+              <a:defRPr sz="1714"/>
             </a:lvl3pPr>
-            <a:lvl4pPr marL="1371600" indent="0">
-              <a:buNone/>
-              <a:defRPr sz="900"/>
+            <a:lvl4pPr marL="2351222" indent="0">
+              <a:buNone/>
+              <a:defRPr sz="1543"/>
             </a:lvl4pPr>
-            <a:lvl5pPr marL="1828800" indent="0">
-              <a:buNone/>
-              <a:defRPr sz="900"/>
+            <a:lvl5pPr marL="3134964" indent="0">
+              <a:buNone/>
+              <a:defRPr sz="1543"/>
             </a:lvl5pPr>
-            <a:lvl6pPr marL="2286000" indent="0">
-              <a:buNone/>
-              <a:defRPr sz="900"/>
+            <a:lvl6pPr marL="3918705" indent="0">
+              <a:buNone/>
+              <a:defRPr sz="1543"/>
             </a:lvl6pPr>
-            <a:lvl7pPr marL="2743200" indent="0">
-              <a:buNone/>
-              <a:defRPr sz="900"/>
+            <a:lvl7pPr marL="4702447" indent="0">
+              <a:buNone/>
+              <a:defRPr sz="1543"/>
             </a:lvl7pPr>
-            <a:lvl8pPr marL="3200400" indent="0">
-              <a:buNone/>
-              <a:defRPr sz="900"/>
+            <a:lvl8pPr marL="5486187" indent="0">
+              <a:buNone/>
+              <a:defRPr sz="1543"/>
             </a:lvl8pPr>
-            <a:lvl9pPr marL="3657600" indent="0">
-              <a:buNone/>
-              <a:defRPr sz="900"/>
+            <a:lvl9pPr marL="6269927" indent="0">
+              <a:buNone/>
+              <a:defRPr sz="1543"/>
             </a:lvl9pPr>
           </a:lstStyle>
           <a:p>
             <a:pPr lvl="0"/>
             <a:r>
-              <a:rPr lang="de-DE" smtClean="0"/>
+              <a:rPr lang="de-DE"/>
               <a:t>Textmasterformat bearbeiten</a:t>
             </a:r>
           </a:p>
@@ -2512,7 +2509,7 @@
           <a:p>
             <a:fld id="{5D1828FC-2644-49F9-9A30-4255A55091FC}" type="datetimeFigureOut">
               <a:rPr lang="de-DE" smtClean="0"/>
-              <a:t>12.08.2020</a:t>
+              <a:t>17.03.2021</a:t>
             </a:fld>
             <a:endParaRPr lang="de-DE"/>
           </a:p>
@@ -2607,8 +2604,8 @@
         </p:nvSpPr>
         <p:spPr>
           <a:xfrm>
-            <a:off x="432038" y="201847"/>
-            <a:ext cx="7776687" cy="840052"/>
+            <a:off x="432046" y="259510"/>
+            <a:ext cx="7776687" cy="1080029"/>
           </a:xfrm>
           <a:prstGeom prst="rect">
             <a:avLst/>
@@ -2621,10 +2618,9 @@
           <a:lstStyle/>
           <a:p>
             <a:r>
-              <a:rPr lang="de-DE" smtClean="0"/>
+              <a:rPr lang="de-DE"/>
               <a:t>Titelmasterformat durch Klicken bearbeiten</a:t>
             </a:r>
-            <a:endParaRPr lang="de-DE"/>
           </a:p>
         </p:txBody>
       </p:sp>
@@ -2640,8 +2636,8 @@
         </p:nvSpPr>
         <p:spPr>
           <a:xfrm>
-            <a:off x="432038" y="1176073"/>
-            <a:ext cx="7776687" cy="3326374"/>
+            <a:off x="432046" y="1512040"/>
+            <a:ext cx="7776687" cy="4276617"/>
           </a:xfrm>
           <a:prstGeom prst="rect">
             <a:avLst/>
@@ -2655,38 +2651,37 @@
           <a:p>
             <a:pPr lvl="0"/>
             <a:r>
-              <a:rPr lang="de-DE" smtClean="0"/>
+              <a:rPr lang="de-DE"/>
               <a:t>Textmasterformat bearbeiten</a:t>
             </a:r>
           </a:p>
           <a:p>
             <a:pPr lvl="1"/>
             <a:r>
-              <a:rPr lang="de-DE" smtClean="0"/>
+              <a:rPr lang="de-DE"/>
               <a:t>Zweite Ebene</a:t>
             </a:r>
           </a:p>
           <a:p>
             <a:pPr lvl="2"/>
             <a:r>
-              <a:rPr lang="de-DE" smtClean="0"/>
+              <a:rPr lang="de-DE"/>
               <a:t>Dritte Ebene</a:t>
             </a:r>
           </a:p>
           <a:p>
             <a:pPr lvl="3"/>
             <a:r>
-              <a:rPr lang="de-DE" smtClean="0"/>
+              <a:rPr lang="de-DE"/>
               <a:t>Vierte Ebene</a:t>
             </a:r>
           </a:p>
           <a:p>
             <a:pPr lvl="4"/>
             <a:r>
-              <a:rPr lang="de-DE" smtClean="0"/>
+              <a:rPr lang="de-DE"/>
               <a:t>Fünfte Ebene</a:t>
             </a:r>
-            <a:endParaRPr lang="de-DE"/>
           </a:p>
         </p:txBody>
       </p:sp>
@@ -2702,8 +2697,8 @@
         </p:nvSpPr>
         <p:spPr>
           <a:xfrm>
-            <a:off x="432038" y="4671624"/>
-            <a:ext cx="2016178" cy="268350"/>
+            <a:off x="432038" y="6006163"/>
+            <a:ext cx="2016178" cy="345010"/>
           </a:xfrm>
           <a:prstGeom prst="rect">
             <a:avLst/>
@@ -2713,7 +2708,7 @@
           <a:bodyPr vert="horz" lIns="91440" tIns="45720" rIns="91440" bIns="45720" rtlCol="0" anchor="ctr"/>
           <a:lstStyle>
             <a:lvl1pPr algn="l">
-              <a:defRPr sz="1200">
+              <a:defRPr sz="2057">
                 <a:solidFill>
                   <a:schemeClr val="tx1">
                     <a:tint val="75000"/>
@@ -2725,7 +2720,7 @@
           <a:p>
             <a:fld id="{5D1828FC-2644-49F9-9A30-4255A55091FC}" type="datetimeFigureOut">
               <a:rPr lang="de-DE" smtClean="0"/>
-              <a:t>12.08.2020</a:t>
+              <a:t>17.03.2021</a:t>
             </a:fld>
             <a:endParaRPr lang="de-DE"/>
           </a:p>
@@ -2743,8 +2738,8 @@
         </p:nvSpPr>
         <p:spPr>
           <a:xfrm>
-            <a:off x="2952261" y="4671624"/>
-            <a:ext cx="2736242" cy="268350"/>
+            <a:off x="2952261" y="6006163"/>
+            <a:ext cx="2736242" cy="345010"/>
           </a:xfrm>
           <a:prstGeom prst="rect">
             <a:avLst/>
@@ -2754,7 +2749,7 @@
           <a:bodyPr vert="horz" lIns="91440" tIns="45720" rIns="91440" bIns="45720" rtlCol="0" anchor="ctr"/>
           <a:lstStyle>
             <a:lvl1pPr algn="ctr">
-              <a:defRPr sz="1200">
+              <a:defRPr sz="2057">
                 <a:solidFill>
                   <a:schemeClr val="tx1">
                     <a:tint val="75000"/>
@@ -2780,8 +2775,8 @@
         </p:nvSpPr>
         <p:spPr>
           <a:xfrm>
-            <a:off x="6192547" y="4671624"/>
-            <a:ext cx="2016178" cy="268350"/>
+            <a:off x="6192547" y="6006163"/>
+            <a:ext cx="2016178" cy="345010"/>
           </a:xfrm>
           <a:prstGeom prst="rect">
             <a:avLst/>
@@ -2791,7 +2786,7 @@
           <a:bodyPr vert="horz" lIns="91440" tIns="45720" rIns="91440" bIns="45720" rtlCol="0" anchor="ctr"/>
           <a:lstStyle>
             <a:lvl1pPr algn="r">
-              <a:defRPr sz="1200">
+              <a:defRPr sz="2057">
                 <a:solidFill>
                   <a:schemeClr val="tx1">
                     <a:tint val="75000"/>
@@ -2832,12 +2827,12 @@
   </p:sldLayoutIdLst>
   <p:txStyles>
     <p:titleStyle>
-      <a:lvl1pPr algn="ctr" defTabSz="914400" rtl="0" eaLnBrk="1" latinLnBrk="0" hangingPunct="1">
+      <a:lvl1pPr algn="ctr" defTabSz="1567482" rtl="0" eaLnBrk="1" latinLnBrk="0" hangingPunct="1">
         <a:spcBef>
           <a:spcPct val="0"/>
         </a:spcBef>
         <a:buNone/>
-        <a:defRPr sz="4400" kern="1200">
+        <a:defRPr sz="7543" kern="1200">
           <a:solidFill>
             <a:schemeClr val="tx1"/>
           </a:solidFill>
@@ -2848,13 +2843,13 @@
       </a:lvl1pPr>
     </p:titleStyle>
     <p:bodyStyle>
-      <a:lvl1pPr marL="342900" indent="-342900" algn="l" defTabSz="914400" rtl="0" eaLnBrk="1" latinLnBrk="0" hangingPunct="1">
+      <a:lvl1pPr marL="587806" indent="-587806" algn="l" defTabSz="1567482" rtl="0" eaLnBrk="1" latinLnBrk="0" hangingPunct="1">
         <a:spcBef>
           <a:spcPct val="20000"/>
         </a:spcBef>
         <a:buFont typeface="Arial" panose="020B0604020202020204" pitchFamily="34" charset="0"/>
         <a:buChar char="•"/>
-        <a:defRPr sz="3200" kern="1200">
+        <a:defRPr sz="5486" kern="1200">
           <a:solidFill>
             <a:schemeClr val="tx1"/>
           </a:solidFill>
@@ -2863,13 +2858,13 @@
           <a:cs typeface="+mn-cs"/>
         </a:defRPr>
       </a:lvl1pPr>
-      <a:lvl2pPr marL="742950" indent="-285750" algn="l" defTabSz="914400" rtl="0" eaLnBrk="1" latinLnBrk="0" hangingPunct="1">
+      <a:lvl2pPr marL="1273579" indent="-489839" algn="l" defTabSz="1567482" rtl="0" eaLnBrk="1" latinLnBrk="0" hangingPunct="1">
         <a:spcBef>
           <a:spcPct val="20000"/>
         </a:spcBef>
         <a:buFont typeface="Arial" panose="020B0604020202020204" pitchFamily="34" charset="0"/>
         <a:buChar char="–"/>
-        <a:defRPr sz="2800" kern="1200">
+        <a:defRPr sz="4800" kern="1200">
           <a:solidFill>
             <a:schemeClr val="tx1"/>
           </a:solidFill>
@@ -2878,13 +2873,13 @@
           <a:cs typeface="+mn-cs"/>
         </a:defRPr>
       </a:lvl2pPr>
-      <a:lvl3pPr marL="1143000" indent="-228600" algn="l" defTabSz="914400" rtl="0" eaLnBrk="1" latinLnBrk="0" hangingPunct="1">
+      <a:lvl3pPr marL="1959352" indent="-391870" algn="l" defTabSz="1567482" rtl="0" eaLnBrk="1" latinLnBrk="0" hangingPunct="1">
         <a:spcBef>
           <a:spcPct val="20000"/>
         </a:spcBef>
         <a:buFont typeface="Arial" panose="020B0604020202020204" pitchFamily="34" charset="0"/>
         <a:buChar char="•"/>
-        <a:defRPr sz="2400" kern="1200">
+        <a:defRPr sz="4114" kern="1200">
           <a:solidFill>
             <a:schemeClr val="tx1"/>
           </a:solidFill>
@@ -2893,13 +2888,13 @@
           <a:cs typeface="+mn-cs"/>
         </a:defRPr>
       </a:lvl3pPr>
-      <a:lvl4pPr marL="1600200" indent="-228600" algn="l" defTabSz="914400" rtl="0" eaLnBrk="1" latinLnBrk="0" hangingPunct="1">
+      <a:lvl4pPr marL="2743094" indent="-391870" algn="l" defTabSz="1567482" rtl="0" eaLnBrk="1" latinLnBrk="0" hangingPunct="1">
         <a:spcBef>
           <a:spcPct val="20000"/>
         </a:spcBef>
         <a:buFont typeface="Arial" panose="020B0604020202020204" pitchFamily="34" charset="0"/>
         <a:buChar char="–"/>
-        <a:defRPr sz="2000" kern="1200">
+        <a:defRPr sz="3429" kern="1200">
           <a:solidFill>
             <a:schemeClr val="tx1"/>
           </a:solidFill>
@@ -2908,13 +2903,13 @@
           <a:cs typeface="+mn-cs"/>
         </a:defRPr>
       </a:lvl4pPr>
-      <a:lvl5pPr marL="2057400" indent="-228600" algn="l" defTabSz="914400" rtl="0" eaLnBrk="1" latinLnBrk="0" hangingPunct="1">
+      <a:lvl5pPr marL="3526835" indent="-391870" algn="l" defTabSz="1567482" rtl="0" eaLnBrk="1" latinLnBrk="0" hangingPunct="1">
         <a:spcBef>
           <a:spcPct val="20000"/>
         </a:spcBef>
         <a:buFont typeface="Arial" panose="020B0604020202020204" pitchFamily="34" charset="0"/>
         <a:buChar char="»"/>
-        <a:defRPr sz="2000" kern="1200">
+        <a:defRPr sz="3429" kern="1200">
           <a:solidFill>
             <a:schemeClr val="tx1"/>
           </a:solidFill>
@@ -2923,13 +2918,13 @@
           <a:cs typeface="+mn-cs"/>
         </a:defRPr>
       </a:lvl5pPr>
-      <a:lvl6pPr marL="2514600" indent="-228600" algn="l" defTabSz="914400" rtl="0" eaLnBrk="1" latinLnBrk="0" hangingPunct="1">
+      <a:lvl6pPr marL="4310575" indent="-391870" algn="l" defTabSz="1567482" rtl="0" eaLnBrk="1" latinLnBrk="0" hangingPunct="1">
         <a:spcBef>
           <a:spcPct val="20000"/>
         </a:spcBef>
         <a:buFont typeface="Arial" panose="020B0604020202020204" pitchFamily="34" charset="0"/>
         <a:buChar char="•"/>
-        <a:defRPr sz="2000" kern="1200">
+        <a:defRPr sz="3429" kern="1200">
           <a:solidFill>
             <a:schemeClr val="tx1"/>
           </a:solidFill>
@@ -2938,13 +2933,13 @@
           <a:cs typeface="+mn-cs"/>
         </a:defRPr>
       </a:lvl6pPr>
-      <a:lvl7pPr marL="2971800" indent="-228600" algn="l" defTabSz="914400" rtl="0" eaLnBrk="1" latinLnBrk="0" hangingPunct="1">
+      <a:lvl7pPr marL="5094317" indent="-391870" algn="l" defTabSz="1567482" rtl="0" eaLnBrk="1" latinLnBrk="0" hangingPunct="1">
         <a:spcBef>
           <a:spcPct val="20000"/>
         </a:spcBef>
         <a:buFont typeface="Arial" panose="020B0604020202020204" pitchFamily="34" charset="0"/>
         <a:buChar char="•"/>
-        <a:defRPr sz="2000" kern="1200">
+        <a:defRPr sz="3429" kern="1200">
           <a:solidFill>
             <a:schemeClr val="tx1"/>
           </a:solidFill>
@@ -2953,13 +2948,13 @@
           <a:cs typeface="+mn-cs"/>
         </a:defRPr>
       </a:lvl7pPr>
-      <a:lvl8pPr marL="3429000" indent="-228600" algn="l" defTabSz="914400" rtl="0" eaLnBrk="1" latinLnBrk="0" hangingPunct="1">
+      <a:lvl8pPr marL="5878057" indent="-391870" algn="l" defTabSz="1567482" rtl="0" eaLnBrk="1" latinLnBrk="0" hangingPunct="1">
         <a:spcBef>
           <a:spcPct val="20000"/>
         </a:spcBef>
         <a:buFont typeface="Arial" panose="020B0604020202020204" pitchFamily="34" charset="0"/>
         <a:buChar char="•"/>
-        <a:defRPr sz="2000" kern="1200">
+        <a:defRPr sz="3429" kern="1200">
           <a:solidFill>
             <a:schemeClr val="tx1"/>
           </a:solidFill>
@@ -2968,13 +2963,13 @@
           <a:cs typeface="+mn-cs"/>
         </a:defRPr>
       </a:lvl8pPr>
-      <a:lvl9pPr marL="3886200" indent="-228600" algn="l" defTabSz="914400" rtl="0" eaLnBrk="1" latinLnBrk="0" hangingPunct="1">
+      <a:lvl9pPr marL="6661797" indent="-391870" algn="l" defTabSz="1567482" rtl="0" eaLnBrk="1" latinLnBrk="0" hangingPunct="1">
         <a:spcBef>
           <a:spcPct val="20000"/>
         </a:spcBef>
         <a:buFont typeface="Arial" panose="020B0604020202020204" pitchFamily="34" charset="0"/>
         <a:buChar char="•"/>
-        <a:defRPr sz="2000" kern="1200">
+        <a:defRPr sz="3429" kern="1200">
           <a:solidFill>
             <a:schemeClr val="tx1"/>
           </a:solidFill>
@@ -2988,8 +2983,8 @@
       <a:defPPr>
         <a:defRPr lang="de-DE"/>
       </a:defPPr>
-      <a:lvl1pPr marL="0" algn="l" defTabSz="914400" rtl="0" eaLnBrk="1" latinLnBrk="0" hangingPunct="1">
-        <a:defRPr sz="1800" kern="1200">
+      <a:lvl1pPr marL="0" algn="l" defTabSz="1567482" rtl="0" eaLnBrk="1" latinLnBrk="0" hangingPunct="1">
+        <a:defRPr sz="3086" kern="1200">
           <a:solidFill>
             <a:schemeClr val="tx1"/>
           </a:solidFill>
@@ -2998,8 +2993,8 @@
           <a:cs typeface="+mn-cs"/>
         </a:defRPr>
       </a:lvl1pPr>
-      <a:lvl2pPr marL="457200" algn="l" defTabSz="914400" rtl="0" eaLnBrk="1" latinLnBrk="0" hangingPunct="1">
-        <a:defRPr sz="1800" kern="1200">
+      <a:lvl2pPr marL="783742" algn="l" defTabSz="1567482" rtl="0" eaLnBrk="1" latinLnBrk="0" hangingPunct="1">
+        <a:defRPr sz="3086" kern="1200">
           <a:solidFill>
             <a:schemeClr val="tx1"/>
           </a:solidFill>
@@ -3008,8 +3003,8 @@
           <a:cs typeface="+mn-cs"/>
         </a:defRPr>
       </a:lvl2pPr>
-      <a:lvl3pPr marL="914400" algn="l" defTabSz="914400" rtl="0" eaLnBrk="1" latinLnBrk="0" hangingPunct="1">
-        <a:defRPr sz="1800" kern="1200">
+      <a:lvl3pPr marL="1567482" algn="l" defTabSz="1567482" rtl="0" eaLnBrk="1" latinLnBrk="0" hangingPunct="1">
+        <a:defRPr sz="3086" kern="1200">
           <a:solidFill>
             <a:schemeClr val="tx1"/>
           </a:solidFill>
@@ -3018,8 +3013,8 @@
           <a:cs typeface="+mn-cs"/>
         </a:defRPr>
       </a:lvl3pPr>
-      <a:lvl4pPr marL="1371600" algn="l" defTabSz="914400" rtl="0" eaLnBrk="1" latinLnBrk="0" hangingPunct="1">
-        <a:defRPr sz="1800" kern="1200">
+      <a:lvl4pPr marL="2351222" algn="l" defTabSz="1567482" rtl="0" eaLnBrk="1" latinLnBrk="0" hangingPunct="1">
+        <a:defRPr sz="3086" kern="1200">
           <a:solidFill>
             <a:schemeClr val="tx1"/>
           </a:solidFill>
@@ -3028,8 +3023,8 @@
           <a:cs typeface="+mn-cs"/>
         </a:defRPr>
       </a:lvl4pPr>
-      <a:lvl5pPr marL="1828800" algn="l" defTabSz="914400" rtl="0" eaLnBrk="1" latinLnBrk="0" hangingPunct="1">
-        <a:defRPr sz="1800" kern="1200">
+      <a:lvl5pPr marL="3134964" algn="l" defTabSz="1567482" rtl="0" eaLnBrk="1" latinLnBrk="0" hangingPunct="1">
+        <a:defRPr sz="3086" kern="1200">
           <a:solidFill>
             <a:schemeClr val="tx1"/>
           </a:solidFill>
@@ -3038,8 +3033,8 @@
           <a:cs typeface="+mn-cs"/>
         </a:defRPr>
       </a:lvl5pPr>
-      <a:lvl6pPr marL="2286000" algn="l" defTabSz="914400" rtl="0" eaLnBrk="1" latinLnBrk="0" hangingPunct="1">
-        <a:defRPr sz="1800" kern="1200">
+      <a:lvl6pPr marL="3918705" algn="l" defTabSz="1567482" rtl="0" eaLnBrk="1" latinLnBrk="0" hangingPunct="1">
+        <a:defRPr sz="3086" kern="1200">
           <a:solidFill>
             <a:schemeClr val="tx1"/>
           </a:solidFill>
@@ -3048,8 +3043,8 @@
           <a:cs typeface="+mn-cs"/>
         </a:defRPr>
       </a:lvl6pPr>
-      <a:lvl7pPr marL="2743200" algn="l" defTabSz="914400" rtl="0" eaLnBrk="1" latinLnBrk="0" hangingPunct="1">
-        <a:defRPr sz="1800" kern="1200">
+      <a:lvl7pPr marL="4702447" algn="l" defTabSz="1567482" rtl="0" eaLnBrk="1" latinLnBrk="0" hangingPunct="1">
+        <a:defRPr sz="3086" kern="1200">
           <a:solidFill>
             <a:schemeClr val="tx1"/>
           </a:solidFill>
@@ -3058,8 +3053,8 @@
           <a:cs typeface="+mn-cs"/>
         </a:defRPr>
       </a:lvl7pPr>
-      <a:lvl8pPr marL="3200400" algn="l" defTabSz="914400" rtl="0" eaLnBrk="1" latinLnBrk="0" hangingPunct="1">
-        <a:defRPr sz="1800" kern="1200">
+      <a:lvl8pPr marL="5486187" algn="l" defTabSz="1567482" rtl="0" eaLnBrk="1" latinLnBrk="0" hangingPunct="1">
+        <a:defRPr sz="3086" kern="1200">
           <a:solidFill>
             <a:schemeClr val="tx1"/>
           </a:solidFill>
@@ -3068,8 +3063,8 @@
           <a:cs typeface="+mn-cs"/>
         </a:defRPr>
       </a:lvl8pPr>
-      <a:lvl9pPr marL="3657600" algn="l" defTabSz="914400" rtl="0" eaLnBrk="1" latinLnBrk="0" hangingPunct="1">
-        <a:defRPr sz="1800" kern="1200">
+      <a:lvl9pPr marL="6269927" algn="l" defTabSz="1567482" rtl="0" eaLnBrk="1" latinLnBrk="0" hangingPunct="1">
+        <a:defRPr sz="3086" kern="1200">
           <a:solidFill>
             <a:schemeClr val="tx1"/>
           </a:solidFill>
@@ -3102,13 +3097,19 @@
       </p:grpSpPr>
       <p:grpSp>
         <p:nvGrpSpPr>
-          <p:cNvPr id="100" name="Gruppieren 99"/>
+          <p:cNvPr id="180" name="Gruppieren 179">
+            <a:extLst>
+              <a:ext uri="{FF2B5EF4-FFF2-40B4-BE49-F238E27FC236}">
+                <a16:creationId xmlns:a16="http://schemas.microsoft.com/office/drawing/2014/main" id="{35C403A1-8C6A-47B8-BB1F-B3D20B5A694A}"/>
+              </a:ext>
+            </a:extLst>
+          </p:cNvPr>
           <p:cNvGrpSpPr/>
           <p:nvPr/>
         </p:nvGrpSpPr>
         <p:grpSpPr>
           <a:xfrm>
-            <a:off x="5397176" y="36007"/>
+            <a:off x="5074448" y="215751"/>
             <a:ext cx="3171677" cy="1072265"/>
             <a:chOff x="5374226" y="1689438"/>
             <a:chExt cx="3171677" cy="1072265"/>
@@ -3116,7 +3117,13 @@
         </p:grpSpPr>
         <p:sp>
           <p:nvSpPr>
-            <p:cNvPr id="101" name="Rechteck 100"/>
+            <p:cNvPr id="181" name="Rechteck 180">
+              <a:extLst>
+                <a:ext uri="{FF2B5EF4-FFF2-40B4-BE49-F238E27FC236}">
+                  <a16:creationId xmlns:a16="http://schemas.microsoft.com/office/drawing/2014/main" id="{3F6CF0A3-2B40-46A2-9A93-9126C2705F69}"/>
+                </a:ext>
+              </a:extLst>
+            </p:cNvPr>
             <p:cNvSpPr/>
             <p:nvPr/>
           </p:nvSpPr>
@@ -3129,10 +3136,7 @@
               <a:avLst/>
             </a:prstGeom>
             <a:solidFill>
-              <a:srgbClr val="A5A5A5">
-                <a:lumMod val="60000"/>
-                <a:lumOff val="40000"/>
-              </a:srgbClr>
+              <a:srgbClr val="A3CDA3"/>
             </a:solidFill>
             <a:ln w="12700" cap="flat" cmpd="sng" algn="ctr">
               <a:solidFill>
@@ -3147,60 +3151,34 @@
             <a:bodyPr rtlCol="0" anchor="ctr"/>
             <a:lstStyle/>
             <a:p>
-              <a:pPr marL="0" marR="0" lvl="0" indent="0" algn="ctr" defTabSz="914400" eaLnBrk="1" fontAlgn="auto" latinLnBrk="0" hangingPunct="1">
-                <a:lnSpc>
-                  <a:spcPct val="100000"/>
-                </a:lnSpc>
-                <a:spcBef>
-                  <a:spcPts val="0"/>
-                </a:spcBef>
-                <a:spcAft>
-                  <a:spcPts val="0"/>
-                </a:spcAft>
-                <a:buClrTx/>
-                <a:buSzTx/>
-                <a:buFontTx/>
-                <a:buNone/>
-                <a:tabLst/>
-                <a:defRPr/>
-              </a:pPr>
+              <a:pPr algn="ctr"/>
               <a:r>
-                <a:rPr kumimoji="0" lang="de-DE" sz="1800" b="0" i="0" u="none" strike="noStrike" kern="0" cap="none" spc="0" normalizeH="0" baseline="0" noProof="0" dirty="0" err="1" smtClean="0">
-                  <a:ln>
-                    <a:noFill/>
-                  </a:ln>
+                <a:rPr lang="de-DE" kern="0" dirty="0" err="1">
                   <a:solidFill>
                     <a:prstClr val="black"/>
                   </a:solidFill>
-                  <a:effectLst/>
-                  <a:uLnTx/>
-                  <a:uFillTx/>
                   <a:latin typeface="Calibri"/>
-                  <a:ea typeface="+mn-ea"/>
-                  <a:cs typeface="+mn-cs"/>
                 </a:rPr>
                 <a:t>BoltzmannMachinesRPlots</a:t>
               </a:r>
-              <a:endParaRPr kumimoji="0" lang="de-DE" sz="1800" b="0" i="0" u="none" strike="noStrike" kern="0" cap="none" spc="0" normalizeH="0" baseline="0" noProof="0" dirty="0">
-                <a:ln>
-                  <a:noFill/>
-                </a:ln>
+              <a:endParaRPr lang="de-DE" kern="0" dirty="0">
                 <a:solidFill>
                   <a:prstClr val="black"/>
                 </a:solidFill>
-                <a:effectLst/>
-                <a:uLnTx/>
-                <a:uFillTx/>
                 <a:latin typeface="Calibri"/>
-                <a:ea typeface="+mn-ea"/>
-                <a:cs typeface="+mn-cs"/>
               </a:endParaRPr>
             </a:p>
           </p:txBody>
         </p:sp>
         <p:pic>
           <p:nvPicPr>
-            <p:cNvPr id="102" name="Picture 3" descr="H:\Pictures\Logos\rlogo.png"/>
+            <p:cNvPr id="182" name="Picture 3" descr="H:\Pictures\Logos\rlogo.png">
+              <a:extLst>
+                <a:ext uri="{FF2B5EF4-FFF2-40B4-BE49-F238E27FC236}">
+                  <a16:creationId xmlns:a16="http://schemas.microsoft.com/office/drawing/2014/main" id="{3DD20CF4-3B22-4707-9B93-B7F99CD00FF7}"/>
+                </a:ext>
+              </a:extLst>
+            </p:cNvPr>
             <p:cNvPicPr>
               <a:picLocks noChangeAspect="1" noChangeArrowheads="1"/>
             </p:cNvPicPr>
@@ -3227,7 +3205,6 @@
             <a:prstGeom prst="rect">
               <a:avLst/>
             </a:prstGeom>
-            <a:noFill/>
             <a:extLst>
               <a:ext uri="{909E8E84-426E-40DD-AFC4-6F175D3DCCD1}">
                 <a14:hiddenFill xmlns:a14="http://schemas.microsoft.com/office/drawing/2010/main">
@@ -3242,37 +3219,46 @@
       </p:grpSp>
       <p:grpSp>
         <p:nvGrpSpPr>
-          <p:cNvPr id="103" name="Gruppieren 102"/>
+          <p:cNvPr id="183" name="Gruppieren 182">
+            <a:extLst>
+              <a:ext uri="{FF2B5EF4-FFF2-40B4-BE49-F238E27FC236}">
+                <a16:creationId xmlns:a16="http://schemas.microsoft.com/office/drawing/2014/main" id="{9C2D79FC-5DE8-4104-8C43-B2DCCA15B517}"/>
+              </a:ext>
+            </a:extLst>
+          </p:cNvPr>
           <p:cNvGrpSpPr/>
           <p:nvPr/>
         </p:nvGrpSpPr>
         <p:grpSpPr>
           <a:xfrm>
-            <a:off x="1371141" y="2837109"/>
-            <a:ext cx="3171246" cy="966246"/>
+            <a:off x="1333117" y="4063093"/>
+            <a:ext cx="3131726" cy="966246"/>
             <a:chOff x="3265028" y="4336484"/>
-            <a:chExt cx="3171246" cy="1064941"/>
+            <a:chExt cx="3131726" cy="1064941"/>
           </a:xfrm>
         </p:grpSpPr>
         <p:sp>
           <p:nvSpPr>
-            <p:cNvPr id="104" name="Rechteck 103"/>
+            <p:cNvPr id="184" name="Rechteck 183">
+              <a:extLst>
+                <a:ext uri="{FF2B5EF4-FFF2-40B4-BE49-F238E27FC236}">
+                  <a16:creationId xmlns:a16="http://schemas.microsoft.com/office/drawing/2014/main" id="{DAB645E4-6535-4534-B594-640CBD5C6C27}"/>
+                </a:ext>
+              </a:extLst>
+            </p:cNvPr>
             <p:cNvSpPr/>
             <p:nvPr/>
           </p:nvSpPr>
           <p:spPr>
             <a:xfrm>
               <a:off x="3488916" y="4447837"/>
-              <a:ext cx="2947358" cy="948906"/>
+              <a:ext cx="2907838" cy="948906"/>
             </a:xfrm>
             <a:prstGeom prst="rect">
               <a:avLst/>
             </a:prstGeom>
             <a:solidFill>
-              <a:srgbClr val="A5A5A5">
-                <a:lumMod val="60000"/>
-                <a:lumOff val="40000"/>
-              </a:srgbClr>
+              <a:srgbClr val="A3CDA3"/>
             </a:solidFill>
             <a:ln w="12700" cap="flat" cmpd="sng" algn="ctr">
               <a:solidFill>
@@ -3287,60 +3273,34 @@
             <a:bodyPr rtlCol="0" anchor="ctr"/>
             <a:lstStyle/>
             <a:p>
-              <a:pPr marL="0" marR="0" lvl="0" indent="0" algn="ctr" defTabSz="914400" eaLnBrk="1" fontAlgn="auto" latinLnBrk="0" hangingPunct="1">
-                <a:lnSpc>
-                  <a:spcPct val="100000"/>
-                </a:lnSpc>
-                <a:spcBef>
-                  <a:spcPts val="0"/>
-                </a:spcBef>
-                <a:spcAft>
-                  <a:spcPts val="0"/>
-                </a:spcAft>
-                <a:buClrTx/>
-                <a:buSzTx/>
-                <a:buFontTx/>
-                <a:buNone/>
-                <a:tabLst/>
-                <a:defRPr/>
-              </a:pPr>
+              <a:pPr algn="ctr"/>
               <a:r>
-                <a:rPr kumimoji="0" lang="de-DE" sz="1800" b="0" i="0" u="none" strike="noStrike" kern="0" cap="none" spc="0" normalizeH="0" baseline="0" noProof="0" dirty="0" err="1" smtClean="0">
-                  <a:ln>
-                    <a:noFill/>
-                  </a:ln>
+                <a:rPr lang="de-DE" kern="0" dirty="0" err="1">
                   <a:solidFill>
                     <a:prstClr val="black"/>
                   </a:solidFill>
-                  <a:effectLst/>
-                  <a:uLnTx/>
-                  <a:uFillTx/>
                   <a:latin typeface="Calibri"/>
-                  <a:ea typeface="+mn-ea"/>
-                  <a:cs typeface="+mn-cs"/>
                 </a:rPr>
                 <a:t>JuliaConnectoR</a:t>
               </a:r>
-              <a:endParaRPr kumimoji="0" lang="de-DE" sz="1800" b="0" i="0" u="none" strike="noStrike" kern="0" cap="none" spc="0" normalizeH="0" baseline="0" noProof="0" dirty="0">
-                <a:ln>
-                  <a:noFill/>
-                </a:ln>
+              <a:endParaRPr lang="de-DE" kern="0" dirty="0">
                 <a:solidFill>
                   <a:prstClr val="black"/>
                 </a:solidFill>
-                <a:effectLst/>
-                <a:uLnTx/>
-                <a:uFillTx/>
                 <a:latin typeface="Calibri"/>
-                <a:ea typeface="+mn-ea"/>
-                <a:cs typeface="+mn-cs"/>
               </a:endParaRPr>
             </a:p>
           </p:txBody>
         </p:sp>
         <p:pic>
           <p:nvPicPr>
-            <p:cNvPr id="105" name="Picture 3" descr="H:\Pictures\Logos\rlogo.png"/>
+            <p:cNvPr id="185" name="Picture 3" descr="H:\Pictures\Logos\rlogo.png">
+              <a:extLst>
+                <a:ext uri="{FF2B5EF4-FFF2-40B4-BE49-F238E27FC236}">
+                  <a16:creationId xmlns:a16="http://schemas.microsoft.com/office/drawing/2014/main" id="{CDCB77D7-3D02-4EB5-BD19-474FFFEA5E3B}"/>
+                </a:ext>
+              </a:extLst>
+            </p:cNvPr>
             <p:cNvPicPr>
               <a:picLocks noChangeAspect="1" noChangeArrowheads="1"/>
             </p:cNvPicPr>
@@ -3381,7 +3341,13 @@
         </p:pic>
         <p:pic>
           <p:nvPicPr>
-            <p:cNvPr id="106" name="Picture 2" descr="H:\Pictures\Logos\Julia_logo.emf"/>
+            <p:cNvPr id="186" name="Picture 2" descr="H:\Pictures\Logos\Julia_logo.emf">
+              <a:extLst>
+                <a:ext uri="{FF2B5EF4-FFF2-40B4-BE49-F238E27FC236}">
+                  <a16:creationId xmlns:a16="http://schemas.microsoft.com/office/drawing/2014/main" id="{57AF6585-0552-4337-A024-7DBBD026E11F}"/>
+                </a:ext>
+              </a:extLst>
+            </p:cNvPr>
             <p:cNvPicPr>
               <a:picLocks noChangeAspect="1" noChangeArrowheads="1"/>
             </p:cNvPicPr>
@@ -3423,13 +3389,686 @@
       </p:grpSp>
       <p:grpSp>
         <p:nvGrpSpPr>
-          <p:cNvPr id="107" name="Gruppieren 106"/>
+          <p:cNvPr id="187" name="Gruppieren 186">
+            <a:extLst>
+              <a:ext uri="{FF2B5EF4-FFF2-40B4-BE49-F238E27FC236}">
+                <a16:creationId xmlns:a16="http://schemas.microsoft.com/office/drawing/2014/main" id="{459F7DD3-EE69-423A-BC90-95FC14221036}"/>
+              </a:ext>
+            </a:extLst>
+          </p:cNvPr>
           <p:cNvGrpSpPr/>
           <p:nvPr/>
         </p:nvGrpSpPr>
         <p:grpSpPr>
           <a:xfrm>
-            <a:off x="1371141" y="44474"/>
+            <a:off x="1333117" y="225273"/>
+            <a:ext cx="3131726" cy="1062740"/>
+            <a:chOff x="1061454" y="1686263"/>
+            <a:chExt cx="3226632" cy="1062740"/>
+          </a:xfrm>
+        </p:grpSpPr>
+        <p:sp>
+          <p:nvSpPr>
+            <p:cNvPr id="188" name="Rechteck 187">
+              <a:extLst>
+                <a:ext uri="{FF2B5EF4-FFF2-40B4-BE49-F238E27FC236}">
+                  <a16:creationId xmlns:a16="http://schemas.microsoft.com/office/drawing/2014/main" id="{28BA91A3-A9E4-4770-B8B1-409562235BD7}"/>
+                </a:ext>
+              </a:extLst>
+            </p:cNvPr>
+            <p:cNvSpPr/>
+            <p:nvPr/>
+          </p:nvSpPr>
+          <p:spPr>
+            <a:xfrm>
+              <a:off x="1284290" y="1800097"/>
+              <a:ext cx="3003796" cy="948906"/>
+            </a:xfrm>
+            <a:prstGeom prst="rect">
+              <a:avLst/>
+            </a:prstGeom>
+            <a:solidFill>
+              <a:srgbClr val="A3CDA3"/>
+            </a:solidFill>
+            <a:ln w="12700" cap="flat" cmpd="sng" algn="ctr">
+              <a:solidFill>
+                <a:sysClr val="window" lastClr="FFFFFF"/>
+              </a:solidFill>
+              <a:prstDash val="solid"/>
+              <a:miter lim="800000"/>
+            </a:ln>
+            <a:effectLst/>
+          </p:spPr>
+          <p:txBody>
+            <a:bodyPr rtlCol="0" anchor="ctr"/>
+            <a:lstStyle/>
+            <a:p>
+              <a:pPr algn="ctr" defTabSz="914357">
+                <a:defRPr/>
+              </a:pPr>
+              <a:r>
+                <a:rPr lang="de-DE" kern="0" dirty="0" err="1">
+                  <a:solidFill>
+                    <a:prstClr val="black"/>
+                  </a:solidFill>
+                  <a:latin typeface="Calibri"/>
+                </a:rPr>
+                <a:t>dsBoltzmannMachinesClient</a:t>
+              </a:r>
+              <a:endParaRPr lang="de-DE" kern="0" dirty="0">
+                <a:solidFill>
+                  <a:prstClr val="black"/>
+                </a:solidFill>
+                <a:latin typeface="Calibri"/>
+              </a:endParaRPr>
+            </a:p>
+          </p:txBody>
+        </p:sp>
+        <p:pic>
+          <p:nvPicPr>
+            <p:cNvPr id="189" name="Picture 3" descr="H:\Pictures\Logos\rlogo.png">
+              <a:extLst>
+                <a:ext uri="{FF2B5EF4-FFF2-40B4-BE49-F238E27FC236}">
+                  <a16:creationId xmlns:a16="http://schemas.microsoft.com/office/drawing/2014/main" id="{CC70092B-B7BE-428E-B884-9082D140943F}"/>
+                </a:ext>
+              </a:extLst>
+            </p:cNvPr>
+            <p:cNvPicPr>
+              <a:picLocks noChangeAspect="1" noChangeArrowheads="1"/>
+            </p:cNvPicPr>
+            <p:nvPr/>
+          </p:nvPicPr>
+          <p:blipFill>
+            <a:blip r:embed="rId5" cstate="print">
+              <a:extLst>
+                <a:ext uri="{28A0092B-C50C-407E-A947-70E740481C1C}">
+                  <a14:useLocalDpi xmlns:a14="http://schemas.microsoft.com/office/drawing/2010/main" val="0"/>
+                </a:ext>
+              </a:extLst>
+            </a:blip>
+            <a:srcRect/>
+            <a:stretch>
+              <a:fillRect/>
+            </a:stretch>
+          </p:blipFill>
+          <p:spPr bwMode="auto">
+            <a:xfrm>
+              <a:off x="1061454" y="1686263"/>
+              <a:ext cx="565421" cy="438202"/>
+            </a:xfrm>
+            <a:prstGeom prst="rect">
+              <a:avLst/>
+            </a:prstGeom>
+            <a:noFill/>
+            <a:extLst>
+              <a:ext uri="{909E8E84-426E-40DD-AFC4-6F175D3DCCD1}">
+                <a14:hiddenFill xmlns:a14="http://schemas.microsoft.com/office/drawing/2010/main">
+                  <a:solidFill>
+                    <a:srgbClr val="FFFFFF"/>
+                  </a:solidFill>
+                </a14:hiddenFill>
+              </a:ext>
+            </a:extLst>
+          </p:spPr>
+        </p:pic>
+      </p:grpSp>
+      <p:grpSp>
+        <p:nvGrpSpPr>
+          <p:cNvPr id="190" name="Gruppieren 189">
+            <a:extLst>
+              <a:ext uri="{FF2B5EF4-FFF2-40B4-BE49-F238E27FC236}">
+                <a16:creationId xmlns:a16="http://schemas.microsoft.com/office/drawing/2014/main" id="{7D18AE38-8F4E-4ED3-81AE-DA7BC82606BF}"/>
+              </a:ext>
+            </a:extLst>
+          </p:cNvPr>
+          <p:cNvGrpSpPr/>
+          <p:nvPr/>
+        </p:nvGrpSpPr>
+        <p:grpSpPr>
+          <a:xfrm>
+            <a:off x="1324801" y="2926517"/>
+            <a:ext cx="3140042" cy="953154"/>
+            <a:chOff x="407697" y="4567212"/>
+            <a:chExt cx="3140042" cy="953154"/>
+          </a:xfrm>
+        </p:grpSpPr>
+        <p:sp>
+          <p:nvSpPr>
+            <p:cNvPr id="191" name="Rechteck 190">
+              <a:extLst>
+                <a:ext uri="{FF2B5EF4-FFF2-40B4-BE49-F238E27FC236}">
+                  <a16:creationId xmlns:a16="http://schemas.microsoft.com/office/drawing/2014/main" id="{BDB6043F-CD7A-47DF-8C71-429F1C40E372}"/>
+                </a:ext>
+              </a:extLst>
+            </p:cNvPr>
+            <p:cNvSpPr/>
+            <p:nvPr/>
+          </p:nvSpPr>
+          <p:spPr>
+            <a:xfrm>
+              <a:off x="632295" y="4571460"/>
+              <a:ext cx="2915444" cy="948906"/>
+            </a:xfrm>
+            <a:prstGeom prst="rect">
+              <a:avLst/>
+            </a:prstGeom>
+            <a:solidFill>
+              <a:srgbClr val="A3CDA3"/>
+            </a:solidFill>
+            <a:ln w="12700" cap="flat" cmpd="sng" algn="ctr">
+              <a:solidFill>
+                <a:sysClr val="window" lastClr="FFFFFF"/>
+              </a:solidFill>
+              <a:prstDash val="solid"/>
+              <a:miter lim="800000"/>
+            </a:ln>
+            <a:effectLst/>
+          </p:spPr>
+          <p:txBody>
+            <a:bodyPr rtlCol="0" anchor="ctr"/>
+            <a:lstStyle/>
+            <a:p>
+              <a:pPr algn="ctr"/>
+              <a:r>
+                <a:rPr lang="de-DE" kern="0" dirty="0" err="1">
+                  <a:solidFill>
+                    <a:prstClr val="black"/>
+                  </a:solidFill>
+                  <a:latin typeface="Calibri"/>
+                </a:rPr>
+                <a:t>dsBoltzmannMachines</a:t>
+              </a:r>
+              <a:endParaRPr lang="de-DE" kern="0" dirty="0">
+                <a:solidFill>
+                  <a:prstClr val="black"/>
+                </a:solidFill>
+                <a:latin typeface="Calibri"/>
+              </a:endParaRPr>
+            </a:p>
+          </p:txBody>
+        </p:sp>
+        <p:pic>
+          <p:nvPicPr>
+            <p:cNvPr id="192" name="Picture 3" descr="H:\Pictures\Logos\rlogo.png">
+              <a:extLst>
+                <a:ext uri="{FF2B5EF4-FFF2-40B4-BE49-F238E27FC236}">
+                  <a16:creationId xmlns:a16="http://schemas.microsoft.com/office/drawing/2014/main" id="{FEBBF07A-69F5-4A14-BEA0-9C353598ACE9}"/>
+                </a:ext>
+              </a:extLst>
+            </p:cNvPr>
+            <p:cNvPicPr>
+              <a:picLocks noChangeAspect="1" noChangeArrowheads="1"/>
+            </p:cNvPicPr>
+            <p:nvPr/>
+          </p:nvPicPr>
+          <p:blipFill>
+            <a:blip r:embed="rId2" cstate="print">
+              <a:extLst>
+                <a:ext uri="{28A0092B-C50C-407E-A947-70E740481C1C}">
+                  <a14:useLocalDpi xmlns:a14="http://schemas.microsoft.com/office/drawing/2010/main" val="0"/>
+                </a:ext>
+              </a:extLst>
+            </a:blip>
+            <a:srcRect/>
+            <a:stretch>
+              <a:fillRect/>
+            </a:stretch>
+          </p:blipFill>
+          <p:spPr bwMode="auto">
+            <a:xfrm>
+              <a:off x="407697" y="5070273"/>
+              <a:ext cx="565421" cy="438202"/>
+            </a:xfrm>
+            <a:prstGeom prst="rect">
+              <a:avLst/>
+            </a:prstGeom>
+            <a:noFill/>
+            <a:extLst>
+              <a:ext uri="{909E8E84-426E-40DD-AFC4-6F175D3DCCD1}">
+                <a14:hiddenFill xmlns:a14="http://schemas.microsoft.com/office/drawing/2010/main">
+                  <a:solidFill>
+                    <a:srgbClr val="FFFFFF"/>
+                  </a:solidFill>
+                </a14:hiddenFill>
+              </a:ext>
+            </a:extLst>
+          </p:spPr>
+        </p:pic>
+        <p:pic>
+          <p:nvPicPr>
+            <p:cNvPr id="193" name="Picture 8" descr="H:\Pictures\Logos\DataSHIELD_Icon.png">
+              <a:extLst>
+                <a:ext uri="{FF2B5EF4-FFF2-40B4-BE49-F238E27FC236}">
+                  <a16:creationId xmlns:a16="http://schemas.microsoft.com/office/drawing/2014/main" id="{53F407A7-B027-4F38-8B84-8CE2F2625477}"/>
+                </a:ext>
+              </a:extLst>
+            </p:cNvPr>
+            <p:cNvPicPr>
+              <a:picLocks noChangeAspect="1" noChangeArrowheads="1"/>
+            </p:cNvPicPr>
+            <p:nvPr/>
+          </p:nvPicPr>
+          <p:blipFill>
+            <a:blip r:embed="rId6" cstate="print">
+              <a:extLst>
+                <a:ext uri="{28A0092B-C50C-407E-A947-70E740481C1C}">
+                  <a14:useLocalDpi xmlns:a14="http://schemas.microsoft.com/office/drawing/2010/main" val="0"/>
+                </a:ext>
+              </a:extLst>
+            </a:blip>
+            <a:srcRect/>
+            <a:stretch>
+              <a:fillRect/>
+            </a:stretch>
+          </p:blipFill>
+          <p:spPr bwMode="auto">
+            <a:xfrm>
+              <a:off x="636602" y="4567212"/>
+              <a:ext cx="306387" cy="386315"/>
+            </a:xfrm>
+            <a:prstGeom prst="rect">
+              <a:avLst/>
+            </a:prstGeom>
+            <a:noFill/>
+            <a:extLst>
+              <a:ext uri="{909E8E84-426E-40DD-AFC4-6F175D3DCCD1}">
+                <a14:hiddenFill xmlns:a14="http://schemas.microsoft.com/office/drawing/2010/main">
+                  <a:solidFill>
+                    <a:srgbClr val="FFFFFF"/>
+                  </a:solidFill>
+                </a14:hiddenFill>
+              </a:ext>
+            </a:extLst>
+          </p:spPr>
+        </p:pic>
+      </p:grpSp>
+      <p:sp>
+        <p:nvSpPr>
+          <p:cNvPr id="194" name="Rechteck 193">
+            <a:extLst>
+              <a:ext uri="{FF2B5EF4-FFF2-40B4-BE49-F238E27FC236}">
+                <a16:creationId xmlns:a16="http://schemas.microsoft.com/office/drawing/2014/main" id="{377EF61C-4316-4006-94CA-C6F159F9C7F9}"/>
+              </a:ext>
+            </a:extLst>
+          </p:cNvPr>
+          <p:cNvSpPr/>
+          <p:nvPr/>
+        </p:nvSpPr>
+        <p:spPr>
+          <a:xfrm>
+            <a:off x="1549399" y="5309546"/>
+            <a:ext cx="2907838" cy="927417"/>
+          </a:xfrm>
+          <a:prstGeom prst="rect">
+            <a:avLst/>
+          </a:prstGeom>
+          <a:solidFill>
+            <a:srgbClr val="A3CDA3"/>
+          </a:solidFill>
+          <a:ln w="12700" cap="flat" cmpd="sng" algn="ctr">
+            <a:solidFill>
+              <a:sysClr val="window" lastClr="FFFFFF"/>
+            </a:solidFill>
+            <a:prstDash val="solid"/>
+            <a:miter lim="800000"/>
+          </a:ln>
+          <a:effectLst/>
+        </p:spPr>
+        <p:txBody>
+          <a:bodyPr rtlCol="0" anchor="ctr"/>
+          <a:lstStyle/>
+          <a:p>
+            <a:pPr algn="ctr"/>
+            <a:r>
+              <a:rPr lang="de-DE" kern="0" dirty="0" err="1">
+                <a:solidFill>
+                  <a:prstClr val="black"/>
+                </a:solidFill>
+                <a:latin typeface="Calibri"/>
+              </a:rPr>
+              <a:t>BoltzmannMachines.jl</a:t>
+            </a:r>
+            <a:endParaRPr lang="de-DE" kern="0" dirty="0">
+              <a:solidFill>
+                <a:prstClr val="black"/>
+              </a:solidFill>
+              <a:latin typeface="Calibri"/>
+            </a:endParaRPr>
+          </a:p>
+        </p:txBody>
+      </p:sp>
+      <p:cxnSp>
+        <p:nvCxnSpPr>
+          <p:cNvPr id="195" name="Gerade Verbindung 115">
+            <a:extLst>
+              <a:ext uri="{FF2B5EF4-FFF2-40B4-BE49-F238E27FC236}">
+                <a16:creationId xmlns:a16="http://schemas.microsoft.com/office/drawing/2014/main" id="{42645CEE-0F42-4536-B30D-3D03CAA74021}"/>
+              </a:ext>
+            </a:extLst>
+          </p:cNvPr>
+          <p:cNvCxnSpPr/>
+          <p:nvPr/>
+        </p:nvCxnSpPr>
+        <p:spPr>
+          <a:xfrm flipV="1">
+            <a:off x="153339" y="2719340"/>
+            <a:ext cx="8258036" cy="16932"/>
+          </a:xfrm>
+          <a:prstGeom prst="line">
+            <a:avLst/>
+          </a:prstGeom>
+          <a:noFill/>
+          <a:ln w="28575" cap="flat" cmpd="sng" algn="ctr">
+            <a:solidFill>
+              <a:srgbClr val="ED7D31"/>
+            </a:solidFill>
+            <a:prstDash val="solid"/>
+            <a:miter lim="800000"/>
+          </a:ln>
+          <a:effectLst/>
+        </p:spPr>
+      </p:cxnSp>
+      <p:sp>
+        <p:nvSpPr>
+          <p:cNvPr id="196" name="Textfeld 195">
+            <a:extLst>
+              <a:ext uri="{FF2B5EF4-FFF2-40B4-BE49-F238E27FC236}">
+                <a16:creationId xmlns:a16="http://schemas.microsoft.com/office/drawing/2014/main" id="{523AD5F9-A2B5-4D65-88FC-8365F73D1C2C}"/>
+              </a:ext>
+            </a:extLst>
+          </p:cNvPr>
+          <p:cNvSpPr txBox="1"/>
+          <p:nvPr/>
+        </p:nvSpPr>
+        <p:spPr>
+          <a:xfrm>
+            <a:off x="107167" y="2254378"/>
+            <a:ext cx="1765020" cy="369332"/>
+          </a:xfrm>
+          <a:prstGeom prst="rect">
+            <a:avLst/>
+          </a:prstGeom>
+          <a:noFill/>
+        </p:spPr>
+        <p:txBody>
+          <a:bodyPr wrap="square" rtlCol="0">
+            <a:spAutoFit/>
+          </a:bodyPr>
+          <a:lstStyle/>
+          <a:p>
+            <a:pPr defTabSz="914357">
+              <a:defRPr/>
+            </a:pPr>
+            <a:r>
+              <a:rPr lang="de-DE" kern="0" dirty="0">
+                <a:solidFill>
+                  <a:prstClr val="black"/>
+                </a:solidFill>
+              </a:rPr>
+              <a:t>Client</a:t>
+            </a:r>
+          </a:p>
+        </p:txBody>
+      </p:sp>
+      <p:sp>
+        <p:nvSpPr>
+          <p:cNvPr id="197" name="Textfeld 196">
+            <a:extLst>
+              <a:ext uri="{FF2B5EF4-FFF2-40B4-BE49-F238E27FC236}">
+                <a16:creationId xmlns:a16="http://schemas.microsoft.com/office/drawing/2014/main" id="{47DB07DB-F8D9-4F99-9310-169BA4DDFD49}"/>
+              </a:ext>
+            </a:extLst>
+          </p:cNvPr>
+          <p:cNvSpPr txBox="1"/>
+          <p:nvPr/>
+        </p:nvSpPr>
+        <p:spPr>
+          <a:xfrm>
+            <a:off x="107167" y="2832451"/>
+            <a:ext cx="984980" cy="369332"/>
+          </a:xfrm>
+          <a:prstGeom prst="rect">
+            <a:avLst/>
+          </a:prstGeom>
+          <a:noFill/>
+        </p:spPr>
+        <p:txBody>
+          <a:bodyPr wrap="square" rtlCol="0">
+            <a:spAutoFit/>
+          </a:bodyPr>
+          <a:lstStyle/>
+          <a:p>
+            <a:pPr defTabSz="914357">
+              <a:defRPr/>
+            </a:pPr>
+            <a:r>
+              <a:rPr lang="de-DE" kern="0" dirty="0">
+                <a:solidFill>
+                  <a:prstClr val="black"/>
+                </a:solidFill>
+              </a:rPr>
+              <a:t>Server</a:t>
+            </a:r>
+          </a:p>
+        </p:txBody>
+      </p:sp>
+      <p:cxnSp>
+        <p:nvCxnSpPr>
+          <p:cNvPr id="198" name="Gerade Verbindung mit Pfeil 197">
+            <a:extLst>
+              <a:ext uri="{FF2B5EF4-FFF2-40B4-BE49-F238E27FC236}">
+                <a16:creationId xmlns:a16="http://schemas.microsoft.com/office/drawing/2014/main" id="{13C0D4E9-4D59-4856-9CB4-C209F8282036}"/>
+              </a:ext>
+            </a:extLst>
+          </p:cNvPr>
+          <p:cNvCxnSpPr>
+            <a:cxnSpLocks/>
+            <a:stCxn id="188" idx="2"/>
+            <a:endCxn id="204" idx="0"/>
+          </p:cNvCxnSpPr>
+          <p:nvPr/>
+        </p:nvCxnSpPr>
+        <p:spPr>
+          <a:xfrm>
+            <a:off x="3007121" y="1288013"/>
+            <a:ext cx="0" cy="282632"/>
+          </a:xfrm>
+          <a:prstGeom prst="straightConnector1">
+            <a:avLst/>
+          </a:prstGeom>
+          <a:noFill/>
+          <a:ln w="25400" cap="flat" cmpd="sng" algn="ctr">
+            <a:solidFill>
+              <a:sysClr val="windowText" lastClr="000000">
+                <a:lumMod val="85000"/>
+                <a:lumOff val="15000"/>
+              </a:sysClr>
+            </a:solidFill>
+            <a:prstDash val="solid"/>
+            <a:miter lim="800000"/>
+            <a:tailEnd type="arrow"/>
+          </a:ln>
+          <a:effectLst/>
+        </p:spPr>
+      </p:cxnSp>
+      <p:cxnSp>
+        <p:nvCxnSpPr>
+          <p:cNvPr id="199" name="Gerade Verbindung mit Pfeil 198">
+            <a:extLst>
+              <a:ext uri="{FF2B5EF4-FFF2-40B4-BE49-F238E27FC236}">
+                <a16:creationId xmlns:a16="http://schemas.microsoft.com/office/drawing/2014/main" id="{C859AE52-56F4-4897-BD66-0A099BAF28EC}"/>
+              </a:ext>
+            </a:extLst>
+          </p:cNvPr>
+          <p:cNvCxnSpPr>
+            <a:stCxn id="188" idx="3"/>
+            <a:endCxn id="181" idx="1"/>
+          </p:cNvCxnSpPr>
+          <p:nvPr/>
+        </p:nvCxnSpPr>
+        <p:spPr>
+          <a:xfrm>
+            <a:off x="4464846" y="813560"/>
+            <a:ext cx="833921" cy="0"/>
+          </a:xfrm>
+          <a:prstGeom prst="straightConnector1">
+            <a:avLst/>
+          </a:prstGeom>
+          <a:noFill/>
+          <a:ln w="25400" cap="flat" cmpd="sng" algn="ctr">
+            <a:solidFill>
+              <a:sysClr val="windowText" lastClr="000000">
+                <a:lumMod val="85000"/>
+                <a:lumOff val="15000"/>
+              </a:sysClr>
+            </a:solidFill>
+            <a:prstDash val="solid"/>
+            <a:miter lim="800000"/>
+            <a:tailEnd type="arrow"/>
+          </a:ln>
+          <a:effectLst/>
+        </p:spPr>
+      </p:cxnSp>
+      <p:cxnSp>
+        <p:nvCxnSpPr>
+          <p:cNvPr id="200" name="Gerade Verbindung mit Pfeil 199">
+            <a:extLst>
+              <a:ext uri="{FF2B5EF4-FFF2-40B4-BE49-F238E27FC236}">
+                <a16:creationId xmlns:a16="http://schemas.microsoft.com/office/drawing/2014/main" id="{1C3BA9CB-29C3-4535-8D11-836E987FA561}"/>
+              </a:ext>
+            </a:extLst>
+          </p:cNvPr>
+          <p:cNvCxnSpPr>
+            <a:cxnSpLocks/>
+            <a:stCxn id="191" idx="2"/>
+            <a:endCxn id="184" idx="0"/>
+          </p:cNvCxnSpPr>
+          <p:nvPr/>
+        </p:nvCxnSpPr>
+        <p:spPr>
+          <a:xfrm>
+            <a:off x="3007124" y="3879673"/>
+            <a:ext cx="3803" cy="284455"/>
+          </a:xfrm>
+          <a:prstGeom prst="straightConnector1">
+            <a:avLst/>
+          </a:prstGeom>
+          <a:noFill/>
+          <a:ln w="25400" cap="flat" cmpd="sng" algn="ctr">
+            <a:solidFill>
+              <a:sysClr val="windowText" lastClr="000000">
+                <a:lumMod val="85000"/>
+                <a:lumOff val="15000"/>
+              </a:sysClr>
+            </a:solidFill>
+            <a:prstDash val="solid"/>
+            <a:miter lim="800000"/>
+            <a:tailEnd type="arrow"/>
+          </a:ln>
+          <a:effectLst/>
+        </p:spPr>
+      </p:cxnSp>
+      <p:cxnSp>
+        <p:nvCxnSpPr>
+          <p:cNvPr id="201" name="Gerade Verbindung mit Pfeil 200">
+            <a:extLst>
+              <a:ext uri="{FF2B5EF4-FFF2-40B4-BE49-F238E27FC236}">
+                <a16:creationId xmlns:a16="http://schemas.microsoft.com/office/drawing/2014/main" id="{780379A0-42E4-457F-91E1-5F3972C6D85C}"/>
+              </a:ext>
+            </a:extLst>
+          </p:cNvPr>
+          <p:cNvCxnSpPr>
+            <a:cxnSpLocks/>
+            <a:stCxn id="184" idx="2"/>
+            <a:endCxn id="194" idx="0"/>
+          </p:cNvCxnSpPr>
+          <p:nvPr/>
+        </p:nvCxnSpPr>
+        <p:spPr>
+          <a:xfrm flipH="1">
+            <a:off x="3003318" y="5025094"/>
+            <a:ext cx="7606" cy="284455"/>
+          </a:xfrm>
+          <a:prstGeom prst="straightConnector1">
+            <a:avLst/>
+          </a:prstGeom>
+          <a:noFill/>
+          <a:ln w="25400" cap="flat" cmpd="sng" algn="ctr">
+            <a:solidFill>
+              <a:sysClr val="windowText" lastClr="000000">
+                <a:lumMod val="85000"/>
+                <a:lumOff val="15000"/>
+              </a:sysClr>
+            </a:solidFill>
+            <a:prstDash val="solid"/>
+            <a:miter lim="800000"/>
+            <a:tailEnd type="arrow"/>
+          </a:ln>
+          <a:effectLst/>
+        </p:spPr>
+      </p:cxnSp>
+      <p:pic>
+        <p:nvPicPr>
+          <p:cNvPr id="202" name="Picture 2" descr="H:\Pictures\Logos\Julia_logo.emf">
+            <a:extLst>
+              <a:ext uri="{FF2B5EF4-FFF2-40B4-BE49-F238E27FC236}">
+                <a16:creationId xmlns:a16="http://schemas.microsoft.com/office/drawing/2014/main" id="{61C9D111-B0DD-45A8-B32D-2FD8321ACE28}"/>
+              </a:ext>
+            </a:extLst>
+          </p:cNvPr>
+          <p:cNvPicPr>
+            <a:picLocks noChangeAspect="1" noChangeArrowheads="1"/>
+          </p:cNvPicPr>
+          <p:nvPr/>
+        </p:nvPicPr>
+        <p:blipFill>
+          <a:blip r:embed="rId4" cstate="print">
+            <a:extLst>
+              <a:ext uri="{28A0092B-C50C-407E-A947-70E740481C1C}">
+                <a14:useLocalDpi xmlns:a14="http://schemas.microsoft.com/office/drawing/2010/main" val="0"/>
+              </a:ext>
+            </a:extLst>
+          </a:blip>
+          <a:srcRect/>
+          <a:stretch>
+            <a:fillRect/>
+          </a:stretch>
+        </p:blipFill>
+        <p:spPr bwMode="auto">
+          <a:xfrm>
+            <a:off x="1560972" y="5309546"/>
+            <a:ext cx="543175" cy="333245"/>
+          </a:xfrm>
+          <a:prstGeom prst="rect">
+            <a:avLst/>
+          </a:prstGeom>
+          <a:noFill/>
+          <a:extLst>
+            <a:ext uri="{909E8E84-426E-40DD-AFC4-6F175D3DCCD1}">
+              <a14:hiddenFill xmlns:a14="http://schemas.microsoft.com/office/drawing/2010/main">
+                <a:solidFill>
+                  <a:srgbClr val="FFFFFF"/>
+                </a:solidFill>
+              </a14:hiddenFill>
+            </a:ext>
+          </a:extLst>
+        </p:spPr>
+      </p:pic>
+      <p:grpSp>
+        <p:nvGrpSpPr>
+          <p:cNvPr id="203" name="Gruppieren 202">
+            <a:extLst>
+              <a:ext uri="{FF2B5EF4-FFF2-40B4-BE49-F238E27FC236}">
+                <a16:creationId xmlns:a16="http://schemas.microsoft.com/office/drawing/2014/main" id="{4893C8FB-A327-487F-B6EE-D526A8E72BF6}"/>
+              </a:ext>
+            </a:extLst>
+          </p:cNvPr>
+          <p:cNvGrpSpPr/>
+          <p:nvPr/>
+        </p:nvGrpSpPr>
+        <p:grpSpPr>
+          <a:xfrm>
+            <a:off x="1333117" y="1456811"/>
             <a:ext cx="3131726" cy="1071776"/>
             <a:chOff x="1061454" y="1686263"/>
             <a:chExt cx="3226632" cy="1071776"/>
@@ -3437,7 +4076,13 @@
         </p:grpSpPr>
         <p:sp>
           <p:nvSpPr>
-            <p:cNvPr id="108" name="Rechteck 107"/>
+            <p:cNvPr id="204" name="Rechteck 203">
+              <a:extLst>
+                <a:ext uri="{FF2B5EF4-FFF2-40B4-BE49-F238E27FC236}">
+                  <a16:creationId xmlns:a16="http://schemas.microsoft.com/office/drawing/2014/main" id="{298C4BA9-E4D8-4C5E-99D9-90B61EF7538A}"/>
+                </a:ext>
+              </a:extLst>
+            </p:cNvPr>
             <p:cNvSpPr/>
             <p:nvPr/>
           </p:nvSpPr>
@@ -3468,60 +4113,36 @@
             <a:bodyPr rtlCol="0" anchor="ctr"/>
             <a:lstStyle/>
             <a:p>
-              <a:pPr marL="0" marR="0" lvl="0" indent="0" algn="ctr" defTabSz="914400" eaLnBrk="1" fontAlgn="auto" latinLnBrk="0" hangingPunct="1">
-                <a:lnSpc>
-                  <a:spcPct val="100000"/>
-                </a:lnSpc>
-                <a:spcBef>
-                  <a:spcPts val="0"/>
-                </a:spcBef>
-                <a:spcAft>
-                  <a:spcPts val="0"/>
-                </a:spcAft>
-                <a:buClrTx/>
-                <a:buSzTx/>
-                <a:buFontTx/>
-                <a:buNone/>
-                <a:tabLst/>
+              <a:pPr algn="ctr" defTabSz="914357">
                 <a:defRPr/>
               </a:pPr>
               <a:r>
-                <a:rPr kumimoji="0" lang="de-DE" sz="1800" b="0" i="0" u="none" strike="noStrike" kern="0" cap="none" spc="0" normalizeH="0" baseline="0" noProof="0" dirty="0" err="1" smtClean="0">
-                  <a:ln>
-                    <a:noFill/>
-                  </a:ln>
+                <a:rPr lang="de-DE" kern="0">
                   <a:solidFill>
                     <a:prstClr val="black"/>
                   </a:solidFill>
-                  <a:effectLst/>
-                  <a:uLnTx/>
-                  <a:uFillTx/>
                   <a:latin typeface="Calibri"/>
-                  <a:ea typeface="+mn-ea"/>
-                  <a:cs typeface="+mn-cs"/>
                 </a:rPr>
-                <a:t>dsBoltzmannMachinesClient</a:t>
+                <a:t>Opal R Client</a:t>
               </a:r>
-              <a:endParaRPr kumimoji="0" lang="de-DE" sz="1800" b="0" i="0" u="none" strike="noStrike" kern="0" cap="none" spc="0" normalizeH="0" baseline="0" noProof="0" dirty="0">
-                <a:ln>
-                  <a:noFill/>
-                </a:ln>
+              <a:endParaRPr lang="de-DE" kern="0" dirty="0">
                 <a:solidFill>
                   <a:prstClr val="black"/>
                 </a:solidFill>
-                <a:effectLst/>
-                <a:uLnTx/>
-                <a:uFillTx/>
                 <a:latin typeface="Calibri"/>
-                <a:ea typeface="+mn-ea"/>
-                <a:cs typeface="+mn-cs"/>
               </a:endParaRPr>
             </a:p>
           </p:txBody>
         </p:sp>
         <p:pic>
           <p:nvPicPr>
-            <p:cNvPr id="109" name="Picture 3" descr="H:\Pictures\Logos\rlogo.png"/>
+            <p:cNvPr id="205" name="Picture 3" descr="H:\Pictures\Logos\rlogo.png">
+              <a:extLst>
+                <a:ext uri="{FF2B5EF4-FFF2-40B4-BE49-F238E27FC236}">
+                  <a16:creationId xmlns:a16="http://schemas.microsoft.com/office/drawing/2014/main" id="{A13D33AA-897E-4BC3-9026-178AB3BC8DFF}"/>
+                </a:ext>
+              </a:extLst>
+            </p:cNvPr>
             <p:cNvPicPr>
               <a:picLocks noChangeAspect="1" noChangeArrowheads="1"/>
             </p:cNvPicPr>
@@ -3562,14 +4183,20 @@
         </p:pic>
         <p:pic>
           <p:nvPicPr>
-            <p:cNvPr id="110" name="Picture 8" descr="H:\Pictures\Logos\DataSHIELD_Icon.png"/>
+            <p:cNvPr id="206" name="Picture 8" descr="H:\Pictures\Logos\DataSHIELD_Icon.png">
+              <a:extLst>
+                <a:ext uri="{FF2B5EF4-FFF2-40B4-BE49-F238E27FC236}">
+                  <a16:creationId xmlns:a16="http://schemas.microsoft.com/office/drawing/2014/main" id="{D67BE578-8CB9-475D-9D2D-0E9922F77F27}"/>
+                </a:ext>
+              </a:extLst>
+            </p:cNvPr>
             <p:cNvPicPr>
               <a:picLocks noChangeAspect="1" noChangeArrowheads="1"/>
             </p:cNvPicPr>
             <p:nvPr/>
           </p:nvPicPr>
           <p:blipFill>
-            <a:blip r:embed="rId6" cstate="print">
+            <a:blip r:embed="rId7" cstate="print">
               <a:extLst>
                 <a:ext uri="{28A0092B-C50C-407E-A947-70E740481C1C}">
                   <a14:useLocalDpi xmlns:a14="http://schemas.microsoft.com/office/drawing/2010/main" val="0"/>
@@ -3602,197 +4229,159 @@
           </p:spPr>
         </p:pic>
       </p:grpSp>
-      <p:grpSp>
-        <p:nvGrpSpPr>
-          <p:cNvPr id="111" name="Gruppieren 110"/>
-          <p:cNvGrpSpPr/>
-          <p:nvPr/>
-        </p:nvGrpSpPr>
-        <p:grpSpPr>
-          <a:xfrm>
-            <a:off x="1373274" y="1701596"/>
-            <a:ext cx="3170171" cy="952875"/>
-            <a:chOff x="377568" y="4567491"/>
-            <a:chExt cx="3170171" cy="952875"/>
-          </a:xfrm>
-        </p:grpSpPr>
-        <p:sp>
-          <p:nvSpPr>
-            <p:cNvPr id="112" name="Rechteck 111"/>
-            <p:cNvSpPr/>
-            <p:nvPr/>
-          </p:nvSpPr>
-          <p:spPr>
-            <a:xfrm>
-              <a:off x="600381" y="4571460"/>
-              <a:ext cx="2947358" cy="948906"/>
-            </a:xfrm>
-            <a:prstGeom prst="rect">
-              <a:avLst/>
-            </a:prstGeom>
-            <a:solidFill>
-              <a:srgbClr val="A5A5A5">
-                <a:lumMod val="60000"/>
-                <a:lumOff val="40000"/>
-              </a:srgbClr>
-            </a:solidFill>
-            <a:ln w="12700" cap="flat" cmpd="sng" algn="ctr">
-              <a:solidFill>
-                <a:sysClr val="window" lastClr="FFFFFF"/>
-              </a:solidFill>
-              <a:prstDash val="solid"/>
-              <a:miter lim="800000"/>
-            </a:ln>
-            <a:effectLst/>
-          </p:spPr>
-          <p:txBody>
-            <a:bodyPr rtlCol="0" anchor="ctr"/>
-            <a:lstStyle/>
-            <a:p>
-              <a:pPr marL="0" marR="0" lvl="0" indent="0" algn="ctr" defTabSz="914400" eaLnBrk="1" fontAlgn="auto" latinLnBrk="0" hangingPunct="1">
-                <a:lnSpc>
-                  <a:spcPct val="100000"/>
-                </a:lnSpc>
-                <a:spcBef>
-                  <a:spcPts val="0"/>
-                </a:spcBef>
-                <a:spcAft>
-                  <a:spcPts val="0"/>
-                </a:spcAft>
-                <a:buClrTx/>
-                <a:buSzTx/>
-                <a:buFontTx/>
-                <a:buNone/>
-                <a:tabLst/>
-                <a:defRPr/>
-              </a:pPr>
-              <a:r>
-                <a:rPr kumimoji="0" lang="de-DE" sz="1800" b="0" i="0" u="none" strike="noStrike" kern="0" cap="none" spc="0" normalizeH="0" baseline="0" noProof="0" dirty="0" err="1" smtClean="0">
-                  <a:ln>
-                    <a:noFill/>
-                  </a:ln>
-                  <a:solidFill>
-                    <a:prstClr val="black"/>
-                  </a:solidFill>
-                  <a:effectLst/>
-                  <a:uLnTx/>
-                  <a:uFillTx/>
-                  <a:latin typeface="Calibri"/>
-                  <a:ea typeface="+mn-ea"/>
-                  <a:cs typeface="+mn-cs"/>
-                </a:rPr>
-                <a:t>dsBoltzmannMachines</a:t>
-              </a:r>
-              <a:endParaRPr kumimoji="0" lang="de-DE" sz="1800" b="0" i="0" u="none" strike="noStrike" kern="0" cap="none" spc="0" normalizeH="0" baseline="0" noProof="0" dirty="0">
-                <a:ln>
-                  <a:noFill/>
-                </a:ln>
-                <a:solidFill>
-                  <a:prstClr val="black"/>
-                </a:solidFill>
-                <a:effectLst/>
-                <a:uLnTx/>
-                <a:uFillTx/>
-                <a:latin typeface="Calibri"/>
-                <a:ea typeface="+mn-ea"/>
-                <a:cs typeface="+mn-cs"/>
-              </a:endParaRPr>
-            </a:p>
-          </p:txBody>
-        </p:sp>
-        <p:pic>
-          <p:nvPicPr>
-            <p:cNvPr id="113" name="Picture 3" descr="H:\Pictures\Logos\rlogo.png"/>
-            <p:cNvPicPr>
-              <a:picLocks noChangeAspect="1" noChangeArrowheads="1"/>
-            </p:cNvPicPr>
-            <p:nvPr/>
-          </p:nvPicPr>
-          <p:blipFill>
-            <a:blip r:embed="rId2" cstate="print">
-              <a:extLst>
-                <a:ext uri="{28A0092B-C50C-407E-A947-70E740481C1C}">
-                  <a14:useLocalDpi xmlns:a14="http://schemas.microsoft.com/office/drawing/2010/main" val="0"/>
-                </a:ext>
-              </a:extLst>
-            </a:blip>
-            <a:srcRect/>
-            <a:stretch>
-              <a:fillRect/>
-            </a:stretch>
-          </p:blipFill>
-          <p:spPr bwMode="auto">
-            <a:xfrm>
-              <a:off x="377568" y="5069280"/>
-              <a:ext cx="565421" cy="438202"/>
-            </a:xfrm>
-            <a:prstGeom prst="rect">
-              <a:avLst/>
-            </a:prstGeom>
-            <a:noFill/>
+      <p:pic>
+        <p:nvPicPr>
+          <p:cNvPr id="207" name="Picture 3" descr="H:\Pictures\Logos\rlogo.png">
             <a:extLst>
-              <a:ext uri="{909E8E84-426E-40DD-AFC4-6F175D3DCCD1}">
-                <a14:hiddenFill xmlns:a14="http://schemas.microsoft.com/office/drawing/2010/main">
-                  <a:solidFill>
-                    <a:srgbClr val="FFFFFF"/>
-                  </a:solidFill>
-                </a14:hiddenFill>
+              <a:ext uri="{FF2B5EF4-FFF2-40B4-BE49-F238E27FC236}">
+                <a16:creationId xmlns:a16="http://schemas.microsoft.com/office/drawing/2014/main" id="{BA79FDD6-65B4-4B80-A4D4-228C71D6FA08}"/>
               </a:ext>
             </a:extLst>
-          </p:spPr>
-        </p:pic>
-        <p:pic>
-          <p:nvPicPr>
-            <p:cNvPr id="114" name="Picture 8" descr="H:\Pictures\Logos\DataSHIELD_Icon.png"/>
-            <p:cNvPicPr>
-              <a:picLocks noChangeAspect="1" noChangeArrowheads="1"/>
-            </p:cNvPicPr>
-            <p:nvPr/>
-          </p:nvPicPr>
-          <p:blipFill>
-            <a:blip r:embed="rId7" cstate="print">
-              <a:extLst>
-                <a:ext uri="{28A0092B-C50C-407E-A947-70E740481C1C}">
-                  <a14:useLocalDpi xmlns:a14="http://schemas.microsoft.com/office/drawing/2010/main" val="0"/>
-                </a:ext>
-              </a:extLst>
-            </a:blip>
-            <a:srcRect/>
-            <a:stretch>
-              <a:fillRect/>
-            </a:stretch>
-          </p:blipFill>
-          <p:spPr bwMode="auto">
-            <a:xfrm>
-              <a:off x="610700" y="4567491"/>
-              <a:ext cx="306387" cy="386315"/>
-            </a:xfrm>
-            <a:prstGeom prst="rect">
-              <a:avLst/>
-            </a:prstGeom>
-            <a:noFill/>
+          </p:cNvPr>
+          <p:cNvPicPr>
+            <a:picLocks noChangeAspect="1" noChangeArrowheads="1"/>
+          </p:cNvPicPr>
+          <p:nvPr/>
+        </p:nvPicPr>
+        <p:blipFill>
+          <a:blip r:embed="rId5" cstate="print">
             <a:extLst>
-              <a:ext uri="{909E8E84-426E-40DD-AFC4-6F175D3DCCD1}">
-                <a14:hiddenFill xmlns:a14="http://schemas.microsoft.com/office/drawing/2010/main">
-                  <a:solidFill>
-                    <a:srgbClr val="FFFFFF"/>
-                  </a:solidFill>
-                </a14:hiddenFill>
+              <a:ext uri="{28A0092B-C50C-407E-A947-70E740481C1C}">
+                <a14:useLocalDpi xmlns:a14="http://schemas.microsoft.com/office/drawing/2010/main" val="0"/>
               </a:ext>
             </a:extLst>
-          </p:spPr>
-        </p:pic>
-      </p:grpSp>
-      <p:sp>
-        <p:nvSpPr>
-          <p:cNvPr id="115" name="Rechteck 114"/>
+          </a:blip>
+          <a:srcRect/>
+          <a:stretch>
+            <a:fillRect/>
+          </a:stretch>
+        </p:blipFill>
+        <p:spPr bwMode="auto">
+          <a:xfrm>
+            <a:off x="1333116" y="883557"/>
+            <a:ext cx="548790" cy="438202"/>
+          </a:xfrm>
+          <a:prstGeom prst="rect">
+            <a:avLst/>
+          </a:prstGeom>
+          <a:noFill/>
+          <a:extLst>
+            <a:ext uri="{909E8E84-426E-40DD-AFC4-6F175D3DCCD1}">
+              <a14:hiddenFill xmlns:a14="http://schemas.microsoft.com/office/drawing/2010/main">
+                <a:solidFill>
+                  <a:srgbClr val="FFFFFF"/>
+                </a:solidFill>
+              </a14:hiddenFill>
+            </a:ext>
+          </a:extLst>
+        </p:spPr>
+      </p:pic>
+      <p:sp>
+        <p:nvSpPr>
+          <p:cNvPr id="208" name="Rechteck 207">
+            <a:extLst>
+              <a:ext uri="{FF2B5EF4-FFF2-40B4-BE49-F238E27FC236}">
+                <a16:creationId xmlns:a16="http://schemas.microsoft.com/office/drawing/2014/main" id="{7E8311A3-EDEC-49B7-949D-18EF3C98655D}"/>
+              </a:ext>
+            </a:extLst>
+          </p:cNvPr>
           <p:cNvSpPr/>
           <p:nvPr/>
         </p:nvSpPr>
         <p:spPr>
           <a:xfrm>
-            <a:off x="1595029" y="4065489"/>
-            <a:ext cx="2947358" cy="927417"/>
+            <a:off x="5866533" y="5428789"/>
+            <a:ext cx="397224" cy="340870"/>
+          </a:xfrm>
+          <a:prstGeom prst="rect">
+            <a:avLst/>
+          </a:prstGeom>
+          <a:solidFill>
+            <a:srgbClr val="A3CDA3"/>
+          </a:solidFill>
+          <a:ln w="12700" cap="flat" cmpd="sng" algn="ctr">
+            <a:solidFill>
+              <a:sysClr val="window" lastClr="FFFFFF"/>
+            </a:solidFill>
+            <a:prstDash val="solid"/>
+            <a:miter lim="800000"/>
+          </a:ln>
+          <a:effectLst/>
+        </p:spPr>
+        <p:txBody>
+          <a:bodyPr rtlCol="0" anchor="ctr"/>
+          <a:lstStyle/>
+          <a:p>
+            <a:pPr algn="ctr"/>
+            <a:endParaRPr lang="de-DE" kern="0" dirty="0">
+              <a:solidFill>
+                <a:prstClr val="black"/>
+              </a:solidFill>
+              <a:latin typeface="Calibri"/>
+            </a:endParaRPr>
+          </a:p>
+        </p:txBody>
+      </p:sp>
+      <p:sp>
+        <p:nvSpPr>
+          <p:cNvPr id="209" name="Textfeld 208">
+            <a:extLst>
+              <a:ext uri="{FF2B5EF4-FFF2-40B4-BE49-F238E27FC236}">
+                <a16:creationId xmlns:a16="http://schemas.microsoft.com/office/drawing/2014/main" id="{3D3EFDB5-F676-47BE-A779-B10C1B868A34}"/>
+              </a:ext>
+            </a:extLst>
+          </p:cNvPr>
+          <p:cNvSpPr txBox="1"/>
+          <p:nvPr/>
+        </p:nvSpPr>
+        <p:spPr>
+          <a:xfrm>
+            <a:off x="6263757" y="5400327"/>
+            <a:ext cx="2357750" cy="369332"/>
+          </a:xfrm>
+          <a:prstGeom prst="rect">
+            <a:avLst/>
+          </a:prstGeom>
+          <a:noFill/>
+        </p:spPr>
+        <p:txBody>
+          <a:bodyPr wrap="square" rtlCol="0">
+            <a:spAutoFit/>
+          </a:bodyPr>
+          <a:lstStyle/>
+          <a:p>
+            <a:r>
+              <a:rPr lang="de-DE" dirty="0" err="1"/>
+              <a:t>Developed</a:t>
+            </a:r>
+            <a:r>
+              <a:rPr lang="de-DE" dirty="0"/>
+              <a:t> R </a:t>
+            </a:r>
+            <a:r>
+              <a:rPr lang="de-DE" dirty="0" err="1"/>
+              <a:t>package</a:t>
+            </a:r>
+            <a:endParaRPr lang="de-DE" dirty="0"/>
+          </a:p>
+        </p:txBody>
+      </p:sp>
+      <p:sp>
+        <p:nvSpPr>
+          <p:cNvPr id="210" name="Rechteck 209">
+            <a:extLst>
+              <a:ext uri="{FF2B5EF4-FFF2-40B4-BE49-F238E27FC236}">
+                <a16:creationId xmlns:a16="http://schemas.microsoft.com/office/drawing/2014/main" id="{2AD2FD22-2278-4C42-8D2D-06677A5D62B9}"/>
+              </a:ext>
+            </a:extLst>
+          </p:cNvPr>
+          <p:cNvSpPr/>
+          <p:nvPr/>
+        </p:nvSpPr>
+        <p:spPr>
+          <a:xfrm>
+            <a:off x="5866534" y="5894167"/>
+            <a:ext cx="397223" cy="323543"/>
           </a:xfrm>
           <a:prstGeom prst="rect">
             <a:avLst/>
@@ -3816,92 +4405,34 @@
           <a:bodyPr rtlCol="0" anchor="ctr"/>
           <a:lstStyle/>
           <a:p>
-            <a:pPr marL="0" marR="0" lvl="0" indent="0" algn="ctr" defTabSz="914400" eaLnBrk="1" fontAlgn="auto" latinLnBrk="0" hangingPunct="1">
-              <a:lnSpc>
-                <a:spcPct val="100000"/>
-              </a:lnSpc>
-              <a:spcBef>
-                <a:spcPts val="0"/>
-              </a:spcBef>
-              <a:spcAft>
-                <a:spcPts val="0"/>
-              </a:spcAft>
-              <a:buClrTx/>
-              <a:buSzTx/>
-              <a:buFontTx/>
-              <a:buNone/>
-              <a:tabLst/>
+            <a:pPr algn="ctr" defTabSz="914357">
               <a:defRPr/>
             </a:pPr>
-            <a:r>
-              <a:rPr kumimoji="0" lang="de-DE" sz="1800" b="0" i="0" u="none" strike="noStrike" kern="0" cap="none" spc="0" normalizeH="0" baseline="0" noProof="0" dirty="0" err="1" smtClean="0">
-                <a:ln>
-                  <a:noFill/>
-                </a:ln>
-                <a:solidFill>
-                  <a:prstClr val="black"/>
-                </a:solidFill>
-                <a:effectLst/>
-                <a:uLnTx/>
-                <a:uFillTx/>
-                <a:latin typeface="Calibri"/>
-                <a:ea typeface="+mn-ea"/>
-                <a:cs typeface="+mn-cs"/>
-              </a:rPr>
-              <a:t>BoltzmannMachines.jl</a:t>
-            </a:r>
-            <a:endParaRPr kumimoji="0" lang="de-DE" sz="1800" b="0" i="0" u="none" strike="noStrike" kern="0" cap="none" spc="0" normalizeH="0" baseline="0" noProof="0" dirty="0">
-              <a:ln>
-                <a:noFill/>
-              </a:ln>
+            <a:endParaRPr lang="de-DE" kern="0" dirty="0">
               <a:solidFill>
                 <a:prstClr val="black"/>
               </a:solidFill>
-              <a:effectLst/>
-              <a:uLnTx/>
-              <a:uFillTx/>
               <a:latin typeface="Calibri"/>
-              <a:ea typeface="+mn-ea"/>
-              <a:cs typeface="+mn-cs"/>
             </a:endParaRPr>
           </a:p>
         </p:txBody>
       </p:sp>
-      <p:cxnSp>
-        <p:nvCxnSpPr>
-          <p:cNvPr id="116" name="Gerade Verbindung 115"/>
-          <p:cNvCxnSpPr/>
-          <p:nvPr/>
-        </p:nvCxnSpPr>
-        <p:spPr>
-          <a:xfrm flipV="1">
-            <a:off x="107609" y="1411504"/>
-            <a:ext cx="8258036" cy="16932"/>
-          </a:xfrm>
-          <a:prstGeom prst="line">
-            <a:avLst/>
-          </a:prstGeom>
-          <a:noFill/>
-          <a:ln w="28575" cap="flat" cmpd="sng" algn="ctr">
-            <a:solidFill>
-              <a:srgbClr val="ED7D31"/>
-            </a:solidFill>
-            <a:prstDash val="solid"/>
-            <a:miter lim="800000"/>
-          </a:ln>
-          <a:effectLst/>
-        </p:spPr>
-      </p:cxnSp>
-      <p:sp>
-        <p:nvSpPr>
-          <p:cNvPr id="117" name="Textfeld 116"/>
+      <p:sp>
+        <p:nvSpPr>
+          <p:cNvPr id="211" name="Textfeld 210">
+            <a:extLst>
+              <a:ext uri="{FF2B5EF4-FFF2-40B4-BE49-F238E27FC236}">
+                <a16:creationId xmlns:a16="http://schemas.microsoft.com/office/drawing/2014/main" id="{8BAC9A61-B611-4045-9FDE-009D8B89C787}"/>
+              </a:ext>
+            </a:extLst>
+          </p:cNvPr>
           <p:cNvSpPr txBox="1"/>
           <p:nvPr/>
         </p:nvSpPr>
         <p:spPr>
           <a:xfrm>
-            <a:off x="32658" y="931584"/>
-            <a:ext cx="1765020" cy="369332"/>
+            <a:off x="6263186" y="5874133"/>
+            <a:ext cx="2147618" cy="369332"/>
           </a:xfrm>
           <a:prstGeom prst="rect">
             <a:avLst/>
@@ -3914,130 +4445,42 @@
           </a:bodyPr>
           <a:lstStyle/>
           <a:p>
-            <a:pPr marL="0" marR="0" lvl="0" indent="0" defTabSz="914400" eaLnBrk="1" fontAlgn="auto" latinLnBrk="0" hangingPunct="1">
-              <a:lnSpc>
-                <a:spcPct val="100000"/>
-              </a:lnSpc>
-              <a:spcBef>
-                <a:spcPts val="0"/>
-              </a:spcBef>
-              <a:spcAft>
-                <a:spcPts val="0"/>
-              </a:spcAft>
-              <a:buClrTx/>
-              <a:buSzTx/>
-              <a:buFontTx/>
-              <a:buNone/>
-              <a:tabLst/>
-              <a:defRPr/>
-            </a:pPr>
-            <a:r>
-              <a:rPr kumimoji="0" lang="de-DE" sz="1800" b="0" i="0" u="none" strike="noStrike" kern="0" cap="none" spc="0" normalizeH="0" baseline="0" noProof="0" dirty="0" smtClean="0">
-                <a:ln>
-                  <a:noFill/>
-                </a:ln>
-                <a:solidFill>
-                  <a:prstClr val="black"/>
-                </a:solidFill>
-                <a:effectLst/>
-                <a:uLnTx/>
-                <a:uFillTx/>
-              </a:rPr>
-              <a:t>Client</a:t>
-            </a:r>
-            <a:endParaRPr kumimoji="0" lang="de-DE" sz="1800" b="0" i="0" u="none" strike="noStrike" kern="0" cap="none" spc="0" normalizeH="0" baseline="0" noProof="0" dirty="0">
-              <a:ln>
-                <a:noFill/>
-              </a:ln>
-              <a:solidFill>
-                <a:prstClr val="black"/>
-              </a:solidFill>
-              <a:effectLst/>
-              <a:uLnTx/>
-              <a:uFillTx/>
-            </a:endParaRPr>
-          </a:p>
-        </p:txBody>
-      </p:sp>
-      <p:sp>
-        <p:nvSpPr>
-          <p:cNvPr id="118" name="Textfeld 117"/>
-          <p:cNvSpPr txBox="1"/>
-          <p:nvPr/>
-        </p:nvSpPr>
-        <p:spPr>
-          <a:xfrm>
-            <a:off x="32658" y="1499703"/>
-            <a:ext cx="984980" cy="369332"/>
-          </a:xfrm>
-          <a:prstGeom prst="rect">
-            <a:avLst/>
-          </a:prstGeom>
-          <a:noFill/>
-        </p:spPr>
-        <p:txBody>
-          <a:bodyPr wrap="square" rtlCol="0">
-            <a:spAutoFit/>
-          </a:bodyPr>
-          <a:lstStyle/>
-          <a:p>
-            <a:pPr marL="0" marR="0" lvl="0" indent="0" defTabSz="914400" eaLnBrk="1" fontAlgn="auto" latinLnBrk="0" hangingPunct="1">
-              <a:lnSpc>
-                <a:spcPct val="100000"/>
-              </a:lnSpc>
-              <a:spcBef>
-                <a:spcPts val="0"/>
-              </a:spcBef>
-              <a:spcAft>
-                <a:spcPts val="0"/>
-              </a:spcAft>
-              <a:buClrTx/>
-              <a:buSzTx/>
-              <a:buFontTx/>
-              <a:buNone/>
-              <a:tabLst/>
-              <a:defRPr/>
-            </a:pPr>
-            <a:r>
-              <a:rPr kumimoji="0" lang="de-DE" sz="1800" b="0" i="0" u="none" strike="noStrike" kern="0" cap="none" spc="0" normalizeH="0" baseline="0" noProof="0" dirty="0" smtClean="0">
-                <a:ln>
-                  <a:noFill/>
-                </a:ln>
-                <a:solidFill>
-                  <a:prstClr val="black"/>
-                </a:solidFill>
-                <a:effectLst/>
-                <a:uLnTx/>
-                <a:uFillTx/>
-              </a:rPr>
-              <a:t>Server</a:t>
-            </a:r>
-            <a:endParaRPr kumimoji="0" lang="de-DE" sz="1800" b="0" i="0" u="none" strike="noStrike" kern="0" cap="none" spc="0" normalizeH="0" baseline="0" noProof="0" dirty="0">
-              <a:ln>
-                <a:noFill/>
-              </a:ln>
-              <a:solidFill>
-                <a:prstClr val="black"/>
-              </a:solidFill>
-              <a:effectLst/>
-              <a:uLnTx/>
-              <a:uFillTx/>
-            </a:endParaRPr>
+            <a:r>
+              <a:rPr lang="de-DE" dirty="0" err="1"/>
+              <a:t>Existing</a:t>
+            </a:r>
+            <a:r>
+              <a:rPr lang="de-DE" dirty="0"/>
+              <a:t> R </a:t>
+            </a:r>
+            <a:r>
+              <a:rPr lang="de-DE" dirty="0" err="1"/>
+              <a:t>package</a:t>
+            </a:r>
+            <a:endParaRPr lang="de-DE" dirty="0"/>
           </a:p>
         </p:txBody>
       </p:sp>
       <p:cxnSp>
         <p:nvCxnSpPr>
-          <p:cNvPr id="119" name="Gerade Verbindung mit Pfeil 118"/>
+          <p:cNvPr id="212" name="Gerade Verbindung mit Pfeil 211">
+            <a:extLst>
+              <a:ext uri="{FF2B5EF4-FFF2-40B4-BE49-F238E27FC236}">
+                <a16:creationId xmlns:a16="http://schemas.microsoft.com/office/drawing/2014/main" id="{76AC558C-9715-4530-B956-09C48104EAF8}"/>
+              </a:ext>
+            </a:extLst>
+          </p:cNvPr>
           <p:cNvCxnSpPr>
-            <a:stCxn id="108" idx="2"/>
+            <a:cxnSpLocks/>
+            <a:stCxn id="204" idx="2"/>
+            <a:endCxn id="191" idx="0"/>
           </p:cNvCxnSpPr>
           <p:nvPr/>
         </p:nvCxnSpPr>
         <p:spPr>
-          <a:xfrm flipH="1">
-            <a:off x="3044243" y="1107214"/>
-            <a:ext cx="902" cy="594382"/>
+          <a:xfrm>
+            <a:off x="3007121" y="2519551"/>
+            <a:ext cx="0" cy="411214"/>
           </a:xfrm>
           <a:prstGeom prst="straightConnector1">
             <a:avLst/>
@@ -4057,143 +4500,6 @@
           <a:effectLst/>
         </p:spPr>
       </p:cxnSp>
-      <p:cxnSp>
-        <p:nvCxnSpPr>
-          <p:cNvPr id="120" name="Gerade Verbindung mit Pfeil 119"/>
-          <p:cNvCxnSpPr>
-            <a:stCxn id="108" idx="3"/>
-            <a:endCxn id="101" idx="1"/>
-          </p:cNvCxnSpPr>
-          <p:nvPr/>
-        </p:nvCxnSpPr>
-        <p:spPr>
-          <a:xfrm>
-            <a:off x="4502867" y="632761"/>
-            <a:ext cx="1118628" cy="1058"/>
-          </a:xfrm>
-          <a:prstGeom prst="straightConnector1">
-            <a:avLst/>
-          </a:prstGeom>
-          <a:noFill/>
-          <a:ln w="25400" cap="flat" cmpd="sng" algn="ctr">
-            <a:solidFill>
-              <a:sysClr val="windowText" lastClr="000000">
-                <a:lumMod val="85000"/>
-                <a:lumOff val="15000"/>
-              </a:sysClr>
-            </a:solidFill>
-            <a:prstDash val="solid"/>
-            <a:miter lim="800000"/>
-            <a:tailEnd type="arrow"/>
-          </a:ln>
-          <a:effectLst/>
-        </p:spPr>
-      </p:cxnSp>
-      <p:cxnSp>
-        <p:nvCxnSpPr>
-          <p:cNvPr id="121" name="Gerade Verbindung mit Pfeil 120"/>
-          <p:cNvCxnSpPr>
-            <a:stCxn id="112" idx="2"/>
-            <a:endCxn id="104" idx="0"/>
-          </p:cNvCxnSpPr>
-          <p:nvPr/>
-        </p:nvCxnSpPr>
-        <p:spPr>
-          <a:xfrm flipH="1">
-            <a:off x="3068708" y="2654471"/>
-            <a:ext cx="1058" cy="283671"/>
-          </a:xfrm>
-          <a:prstGeom prst="straightConnector1">
-            <a:avLst/>
-          </a:prstGeom>
-          <a:noFill/>
-          <a:ln w="25400" cap="flat" cmpd="sng" algn="ctr">
-            <a:solidFill>
-              <a:sysClr val="windowText" lastClr="000000">
-                <a:lumMod val="85000"/>
-                <a:lumOff val="15000"/>
-              </a:sysClr>
-            </a:solidFill>
-            <a:prstDash val="solid"/>
-            <a:miter lim="800000"/>
-            <a:tailEnd type="arrow"/>
-          </a:ln>
-          <a:effectLst/>
-        </p:spPr>
-      </p:cxnSp>
-      <p:cxnSp>
-        <p:nvCxnSpPr>
-          <p:cNvPr id="122" name="Gerade Verbindung mit Pfeil 121"/>
-          <p:cNvCxnSpPr>
-            <a:stCxn id="104" idx="2"/>
-            <a:endCxn id="115" idx="0"/>
-          </p:cNvCxnSpPr>
-          <p:nvPr/>
-        </p:nvCxnSpPr>
-        <p:spPr>
-          <a:xfrm>
-            <a:off x="3068708" y="3799107"/>
-            <a:ext cx="0" cy="266382"/>
-          </a:xfrm>
-          <a:prstGeom prst="straightConnector1">
-            <a:avLst/>
-          </a:prstGeom>
-          <a:noFill/>
-          <a:ln w="25400" cap="flat" cmpd="sng" algn="ctr">
-            <a:solidFill>
-              <a:sysClr val="windowText" lastClr="000000">
-                <a:lumMod val="85000"/>
-                <a:lumOff val="15000"/>
-              </a:sysClr>
-            </a:solidFill>
-            <a:prstDash val="solid"/>
-            <a:miter lim="800000"/>
-            <a:tailEnd type="arrow"/>
-          </a:ln>
-          <a:effectLst/>
-        </p:spPr>
-      </p:cxnSp>
-      <p:pic>
-        <p:nvPicPr>
-          <p:cNvPr id="123" name="Picture 2" descr="H:\Pictures\Logos\Julia_logo.emf"/>
-          <p:cNvPicPr>
-            <a:picLocks noChangeAspect="1" noChangeArrowheads="1"/>
-          </p:cNvPicPr>
-          <p:nvPr/>
-        </p:nvPicPr>
-        <p:blipFill>
-          <a:blip r:embed="rId4" cstate="print">
-            <a:extLst>
-              <a:ext uri="{28A0092B-C50C-407E-A947-70E740481C1C}">
-                <a14:useLocalDpi xmlns:a14="http://schemas.microsoft.com/office/drawing/2010/main" val="0"/>
-              </a:ext>
-            </a:extLst>
-          </a:blip>
-          <a:srcRect/>
-          <a:stretch>
-            <a:fillRect/>
-          </a:stretch>
-        </p:blipFill>
-        <p:spPr bwMode="auto">
-          <a:xfrm>
-            <a:off x="1606602" y="4065489"/>
-            <a:ext cx="543175" cy="333245"/>
-          </a:xfrm>
-          <a:prstGeom prst="rect">
-            <a:avLst/>
-          </a:prstGeom>
-          <a:noFill/>
-          <a:extLst>
-            <a:ext uri="{909E8E84-426E-40DD-AFC4-6F175D3DCCD1}">
-              <a14:hiddenFill xmlns:a14="http://schemas.microsoft.com/office/drawing/2010/main">
-                <a:solidFill>
-                  <a:srgbClr val="FFFFFF"/>
-                </a:solidFill>
-              </a14:hiddenFill>
-            </a:ext>
-          </a:extLst>
-        </p:spPr>
-      </p:pic>
     </p:spTree>
     <p:extLst>
       <p:ext uri="{BB962C8B-B14F-4D97-AF65-F5344CB8AC3E}">

</xml_diff>

<commit_message>
Started explaining the code step by step
</commit_message>
<xml_diff>
--- a/images/dsBoltzmannMachinesOverview.pptx
+++ b/images/dsBoltzmannMachinesOverview.pptx
@@ -3110,9 +3110,9 @@
         <p:grpSpPr>
           <a:xfrm>
             <a:off x="5074448" y="215751"/>
-            <a:ext cx="3171677" cy="1072265"/>
+            <a:ext cx="3139760" cy="1072265"/>
             <a:chOff x="5374226" y="1689438"/>
-            <a:chExt cx="3171677" cy="1072265"/>
+            <a:chExt cx="3139760" cy="1072265"/>
           </a:xfrm>
         </p:grpSpPr>
         <p:sp>
@@ -3130,7 +3130,7 @@
           <p:spPr>
             <a:xfrm>
               <a:off x="5598545" y="1812797"/>
-              <a:ext cx="2947358" cy="948906"/>
+              <a:ext cx="2915441" cy="948906"/>
             </a:xfrm>
             <a:prstGeom prst="rect">
               <a:avLst/>
@@ -3387,131 +3387,63 @@
           </p:spPr>
         </p:pic>
       </p:grpSp>
-      <p:grpSp>
-        <p:nvGrpSpPr>
-          <p:cNvPr id="187" name="Gruppieren 186">
+      <p:sp>
+        <p:nvSpPr>
+          <p:cNvPr id="188" name="Rechteck 187">
             <a:extLst>
               <a:ext uri="{FF2B5EF4-FFF2-40B4-BE49-F238E27FC236}">
-                <a16:creationId xmlns:a16="http://schemas.microsoft.com/office/drawing/2014/main" id="{459F7DD3-EE69-423A-BC90-95FC14221036}"/>
+                <a16:creationId xmlns:a16="http://schemas.microsoft.com/office/drawing/2014/main" id="{28BA91A3-A9E4-4770-B8B1-409562235BD7}"/>
               </a:ext>
             </a:extLst>
           </p:cNvPr>
-          <p:cNvGrpSpPr/>
+          <p:cNvSpPr/>
           <p:nvPr/>
-        </p:nvGrpSpPr>
-        <p:grpSpPr>
+        </p:nvSpPr>
+        <p:spPr>
           <a:xfrm>
-            <a:off x="1333117" y="225273"/>
-            <a:ext cx="3131726" cy="1062740"/>
-            <a:chOff x="1061454" y="1686263"/>
-            <a:chExt cx="3226632" cy="1062740"/>
+            <a:off x="1549399" y="339107"/>
+            <a:ext cx="2915444" cy="948906"/>
           </a:xfrm>
-        </p:grpSpPr>
-        <p:sp>
-          <p:nvSpPr>
-            <p:cNvPr id="188" name="Rechteck 187">
-              <a:extLst>
-                <a:ext uri="{FF2B5EF4-FFF2-40B4-BE49-F238E27FC236}">
-                  <a16:creationId xmlns:a16="http://schemas.microsoft.com/office/drawing/2014/main" id="{28BA91A3-A9E4-4770-B8B1-409562235BD7}"/>
-                </a:ext>
-              </a:extLst>
-            </p:cNvPr>
-            <p:cNvSpPr/>
-            <p:nvPr/>
-          </p:nvSpPr>
-          <p:spPr>
-            <a:xfrm>
-              <a:off x="1284290" y="1800097"/>
-              <a:ext cx="3003796" cy="948906"/>
-            </a:xfrm>
-            <a:prstGeom prst="rect">
-              <a:avLst/>
-            </a:prstGeom>
+          <a:prstGeom prst="rect">
+            <a:avLst/>
+          </a:prstGeom>
+          <a:solidFill>
+            <a:srgbClr val="A3CDA3"/>
+          </a:solidFill>
+          <a:ln w="12700" cap="flat" cmpd="sng" algn="ctr">
             <a:solidFill>
-              <a:srgbClr val="A3CDA3"/>
+              <a:sysClr val="window" lastClr="FFFFFF"/>
             </a:solidFill>
-            <a:ln w="12700" cap="flat" cmpd="sng" algn="ctr">
-              <a:solidFill>
-                <a:sysClr val="window" lastClr="FFFFFF"/>
-              </a:solidFill>
-              <a:prstDash val="solid"/>
-              <a:miter lim="800000"/>
-            </a:ln>
-            <a:effectLst/>
-          </p:spPr>
-          <p:txBody>
-            <a:bodyPr rtlCol="0" anchor="ctr"/>
-            <a:lstStyle/>
-            <a:p>
-              <a:pPr algn="ctr" defTabSz="914357">
-                <a:defRPr/>
-              </a:pPr>
-              <a:r>
-                <a:rPr lang="de-DE" kern="0" dirty="0" err="1">
-                  <a:solidFill>
-                    <a:prstClr val="black"/>
-                  </a:solidFill>
-                  <a:latin typeface="Calibri"/>
-                </a:rPr>
-                <a:t>dsBoltzmannMachinesClient</a:t>
-              </a:r>
-              <a:endParaRPr lang="de-DE" kern="0" dirty="0">
+            <a:prstDash val="solid"/>
+            <a:miter lim="800000"/>
+          </a:ln>
+          <a:effectLst/>
+        </p:spPr>
+        <p:txBody>
+          <a:bodyPr rtlCol="0" anchor="ctr"/>
+          <a:lstStyle/>
+          <a:p>
+            <a:pPr algn="ctr" defTabSz="914357">
+              <a:defRPr/>
+            </a:pPr>
+            <a:r>
+              <a:rPr lang="de-DE" kern="0" dirty="0" err="1">
                 <a:solidFill>
                   <a:prstClr val="black"/>
                 </a:solidFill>
                 <a:latin typeface="Calibri"/>
-              </a:endParaRPr>
-            </a:p>
-          </p:txBody>
-        </p:sp>
-        <p:pic>
-          <p:nvPicPr>
-            <p:cNvPr id="189" name="Picture 3" descr="H:\Pictures\Logos\rlogo.png">
-              <a:extLst>
-                <a:ext uri="{FF2B5EF4-FFF2-40B4-BE49-F238E27FC236}">
-                  <a16:creationId xmlns:a16="http://schemas.microsoft.com/office/drawing/2014/main" id="{CC70092B-B7BE-428E-B884-9082D140943F}"/>
-                </a:ext>
-              </a:extLst>
-            </p:cNvPr>
-            <p:cNvPicPr>
-              <a:picLocks noChangeAspect="1" noChangeArrowheads="1"/>
-            </p:cNvPicPr>
-            <p:nvPr/>
-          </p:nvPicPr>
-          <p:blipFill>
-            <a:blip r:embed="rId5" cstate="print">
-              <a:extLst>
-                <a:ext uri="{28A0092B-C50C-407E-A947-70E740481C1C}">
-                  <a14:useLocalDpi xmlns:a14="http://schemas.microsoft.com/office/drawing/2010/main" val="0"/>
-                </a:ext>
-              </a:extLst>
-            </a:blip>
-            <a:srcRect/>
-            <a:stretch>
-              <a:fillRect/>
-            </a:stretch>
-          </p:blipFill>
-          <p:spPr bwMode="auto">
-            <a:xfrm>
-              <a:off x="1061454" y="1686263"/>
-              <a:ext cx="565421" cy="438202"/>
-            </a:xfrm>
-            <a:prstGeom prst="rect">
-              <a:avLst/>
-            </a:prstGeom>
-            <a:noFill/>
-            <a:extLst>
-              <a:ext uri="{909E8E84-426E-40DD-AFC4-6F175D3DCCD1}">
-                <a14:hiddenFill xmlns:a14="http://schemas.microsoft.com/office/drawing/2010/main">
-                  <a:solidFill>
-                    <a:srgbClr val="FFFFFF"/>
-                  </a:solidFill>
-                </a14:hiddenFill>
-              </a:ext>
-            </a:extLst>
-          </p:spPr>
-        </p:pic>
-      </p:grpSp>
+              </a:rPr>
+              <a:t>dsBoltzmannMachinesClient</a:t>
+            </a:r>
+            <a:endParaRPr lang="de-DE" kern="0" dirty="0">
+              <a:solidFill>
+                <a:prstClr val="black"/>
+              </a:solidFill>
+              <a:latin typeface="Calibri"/>
+            </a:endParaRPr>
+          </a:p>
+        </p:txBody>
+      </p:sp>
       <p:grpSp>
         <p:nvGrpSpPr>
           <p:cNvPr id="190" name="Gruppieren 189">
@@ -3649,7 +3581,7 @@
             <p:nvPr/>
           </p:nvPicPr>
           <p:blipFill>
-            <a:blip r:embed="rId6" cstate="print">
+            <a:blip r:embed="rId5" cstate="print">
               <a:extLst>
                 <a:ext uri="{28A0092B-C50C-407E-A947-70E740481C1C}">
                   <a14:useLocalDpi xmlns:a14="http://schemas.microsoft.com/office/drawing/2010/main" val="0"/>
@@ -3901,6 +3833,7 @@
             </a:extLst>
           </p:cNvPr>
           <p:cNvCxnSpPr>
+            <a:cxnSpLocks/>
             <a:stCxn id="188" idx="3"/>
             <a:endCxn id="181" idx="1"/>
           </p:cNvCxnSpPr>
@@ -3908,8 +3841,8 @@
         </p:nvCxnSpPr>
         <p:spPr>
           <a:xfrm>
-            <a:off x="4464846" y="813560"/>
-            <a:ext cx="833921" cy="0"/>
+            <a:off x="4464843" y="813560"/>
+            <a:ext cx="833924" cy="3"/>
           </a:xfrm>
           <a:prstGeom prst="straightConnector1">
             <a:avLst/>
@@ -4117,7 +4050,7 @@
                 <a:defRPr/>
               </a:pPr>
               <a:r>
-                <a:rPr lang="de-DE" kern="0">
+                <a:rPr lang="de-DE" kern="0" dirty="0">
                   <a:solidFill>
                     <a:prstClr val="black"/>
                   </a:solidFill>
@@ -4125,12 +4058,6 @@
                 </a:rPr>
                 <a:t>Opal R Client</a:t>
               </a:r>
-              <a:endParaRPr lang="de-DE" kern="0" dirty="0">
-                <a:solidFill>
-                  <a:prstClr val="black"/>
-                </a:solidFill>
-                <a:latin typeface="Calibri"/>
-              </a:endParaRPr>
             </a:p>
           </p:txBody>
         </p:sp>
@@ -4149,7 +4076,7 @@
             <p:nvPr/>
           </p:nvPicPr>
           <p:blipFill>
-            <a:blip r:embed="rId5" cstate="print">
+            <a:blip r:embed="rId6" cstate="print">
               <a:extLst>
                 <a:ext uri="{28A0092B-C50C-407E-A947-70E740481C1C}">
                   <a14:useLocalDpi xmlns:a14="http://schemas.microsoft.com/office/drawing/2010/main" val="0"/>
@@ -4244,7 +4171,7 @@
           <p:nvPr/>
         </p:nvPicPr>
         <p:blipFill>
-          <a:blip r:embed="rId5" cstate="print">
+          <a:blip r:embed="rId6" cstate="print">
             <a:extLst>
               <a:ext uri="{28A0092B-C50C-407E-A947-70E740481C1C}">
                 <a14:useLocalDpi xmlns:a14="http://schemas.microsoft.com/office/drawing/2010/main" val="0"/>
@@ -4500,6 +4427,192 @@
           <a:effectLst/>
         </p:spPr>
       </p:cxnSp>
+      <p:sp>
+        <p:nvSpPr>
+          <p:cNvPr id="35" name="Rechteck 34">
+            <a:extLst>
+              <a:ext uri="{FF2B5EF4-FFF2-40B4-BE49-F238E27FC236}">
+                <a16:creationId xmlns:a16="http://schemas.microsoft.com/office/drawing/2014/main" id="{63EDDB3C-EE71-4C5A-A601-0E33CCA9FEDB}"/>
+              </a:ext>
+            </a:extLst>
+          </p:cNvPr>
+          <p:cNvSpPr/>
+          <p:nvPr/>
+        </p:nvSpPr>
+        <p:spPr>
+          <a:xfrm>
+            <a:off x="5298767" y="1544183"/>
+            <a:ext cx="2915444" cy="948906"/>
+          </a:xfrm>
+          <a:prstGeom prst="rect">
+            <a:avLst/>
+          </a:prstGeom>
+          <a:solidFill>
+            <a:srgbClr val="A5A5A5">
+              <a:lumMod val="60000"/>
+              <a:lumOff val="40000"/>
+            </a:srgbClr>
+          </a:solidFill>
+          <a:ln w="12700" cap="flat" cmpd="sng" algn="ctr">
+            <a:solidFill>
+              <a:sysClr val="window" lastClr="FFFFFF"/>
+            </a:solidFill>
+            <a:prstDash val="solid"/>
+            <a:miter lim="800000"/>
+          </a:ln>
+          <a:effectLst/>
+        </p:spPr>
+        <p:txBody>
+          <a:bodyPr rtlCol="0" anchor="ctr"/>
+          <a:lstStyle/>
+          <a:p>
+            <a:pPr algn="ctr" defTabSz="914357">
+              <a:defRPr/>
+            </a:pPr>
+            <a:r>
+              <a:rPr lang="de-DE" kern="0" dirty="0">
+                <a:solidFill>
+                  <a:prstClr val="black"/>
+                </a:solidFill>
+                <a:latin typeface="Calibri"/>
+              </a:rPr>
+              <a:t>ggplot2</a:t>
+            </a:r>
+          </a:p>
+        </p:txBody>
+      </p:sp>
+      <p:cxnSp>
+        <p:nvCxnSpPr>
+          <p:cNvPr id="37" name="Gerade Verbindung mit Pfeil 36">
+            <a:extLst>
+              <a:ext uri="{FF2B5EF4-FFF2-40B4-BE49-F238E27FC236}">
+                <a16:creationId xmlns:a16="http://schemas.microsoft.com/office/drawing/2014/main" id="{C4D5530D-6237-4A58-AF27-CB28F7DDE7E6}"/>
+              </a:ext>
+            </a:extLst>
+          </p:cNvPr>
+          <p:cNvCxnSpPr>
+            <a:cxnSpLocks/>
+            <a:stCxn id="181" idx="2"/>
+            <a:endCxn id="35" idx="0"/>
+          </p:cNvCxnSpPr>
+          <p:nvPr/>
+        </p:nvCxnSpPr>
+        <p:spPr>
+          <a:xfrm>
+            <a:off x="6756488" y="1288016"/>
+            <a:ext cx="1" cy="256167"/>
+          </a:xfrm>
+          <a:prstGeom prst="straightConnector1">
+            <a:avLst/>
+          </a:prstGeom>
+          <a:noFill/>
+          <a:ln w="25400" cap="flat" cmpd="sng" algn="ctr">
+            <a:solidFill>
+              <a:sysClr val="windowText" lastClr="000000">
+                <a:lumMod val="85000"/>
+                <a:lumOff val="15000"/>
+              </a:sysClr>
+            </a:solidFill>
+            <a:prstDash val="solid"/>
+            <a:miter lim="800000"/>
+            <a:tailEnd type="arrow"/>
+          </a:ln>
+          <a:effectLst/>
+        </p:spPr>
+      </p:cxnSp>
+      <p:pic>
+        <p:nvPicPr>
+          <p:cNvPr id="41" name="Picture 3" descr="H:\Pictures\Logos\rlogo.png">
+            <a:extLst>
+              <a:ext uri="{FF2B5EF4-FFF2-40B4-BE49-F238E27FC236}">
+                <a16:creationId xmlns:a16="http://schemas.microsoft.com/office/drawing/2014/main" id="{15FD8EAA-F08A-437E-9453-9F12E46D8AFF}"/>
+              </a:ext>
+            </a:extLst>
+          </p:cNvPr>
+          <p:cNvPicPr>
+            <a:picLocks noChangeAspect="1" noChangeArrowheads="1"/>
+          </p:cNvPicPr>
+          <p:nvPr/>
+        </p:nvPicPr>
+        <p:blipFill>
+          <a:blip r:embed="rId2" cstate="print">
+            <a:extLst>
+              <a:ext uri="{28A0092B-C50C-407E-A947-70E740481C1C}">
+                <a14:useLocalDpi xmlns:a14="http://schemas.microsoft.com/office/drawing/2010/main" val="0"/>
+              </a:ext>
+            </a:extLst>
+          </a:blip>
+          <a:srcRect/>
+          <a:stretch>
+            <a:fillRect/>
+          </a:stretch>
+        </p:blipFill>
+        <p:spPr bwMode="auto">
+          <a:xfrm>
+            <a:off x="5085826" y="1443009"/>
+            <a:ext cx="565421" cy="438202"/>
+          </a:xfrm>
+          <a:prstGeom prst="rect">
+            <a:avLst/>
+          </a:prstGeom>
+          <a:extLst>
+            <a:ext uri="{909E8E84-426E-40DD-AFC4-6F175D3DCCD1}">
+              <a14:hiddenFill xmlns:a14="http://schemas.microsoft.com/office/drawing/2010/main">
+                <a:solidFill>
+                  <a:srgbClr val="FFFFFF"/>
+                </a:solidFill>
+              </a14:hiddenFill>
+            </a:ext>
+          </a:extLst>
+        </p:spPr>
+      </p:pic>
+      <p:pic>
+        <p:nvPicPr>
+          <p:cNvPr id="36" name="Picture 3" descr="H:\Pictures\Logos\rlogo.png">
+            <a:extLst>
+              <a:ext uri="{FF2B5EF4-FFF2-40B4-BE49-F238E27FC236}">
+                <a16:creationId xmlns:a16="http://schemas.microsoft.com/office/drawing/2014/main" id="{AB44E683-1CA5-40A8-8DB5-001CD0736ADD}"/>
+              </a:ext>
+            </a:extLst>
+          </p:cNvPr>
+          <p:cNvPicPr>
+            <a:picLocks noChangeAspect="1" noChangeArrowheads="1"/>
+          </p:cNvPicPr>
+          <p:nvPr/>
+        </p:nvPicPr>
+        <p:blipFill>
+          <a:blip r:embed="rId6" cstate="print">
+            <a:extLst>
+              <a:ext uri="{28A0092B-C50C-407E-A947-70E740481C1C}">
+                <a14:useLocalDpi xmlns:a14="http://schemas.microsoft.com/office/drawing/2010/main" val="0"/>
+              </a:ext>
+            </a:extLst>
+          </a:blip>
+          <a:srcRect/>
+          <a:stretch>
+            <a:fillRect/>
+          </a:stretch>
+        </p:blipFill>
+        <p:spPr bwMode="auto">
+          <a:xfrm>
+            <a:off x="1333116" y="222361"/>
+            <a:ext cx="548790" cy="438202"/>
+          </a:xfrm>
+          <a:prstGeom prst="rect">
+            <a:avLst/>
+          </a:prstGeom>
+          <a:noFill/>
+          <a:extLst>
+            <a:ext uri="{909E8E84-426E-40DD-AFC4-6F175D3DCCD1}">
+              <a14:hiddenFill xmlns:a14="http://schemas.microsoft.com/office/drawing/2010/main">
+                <a:solidFill>
+                  <a:srgbClr val="FFFFFF"/>
+                </a:solidFill>
+              </a14:hiddenFill>
+            </a:ext>
+          </a:extLst>
+        </p:spPr>
+      </p:pic>
     </p:spTree>
     <p:extLst>
       <p:ext uri="{BB962C8B-B14F-4D97-AF65-F5344CB8AC3E}">

</xml_diff>

<commit_message>
Kleine Änderung an dsBoltzmannOverview
</commit_message>
<xml_diff>
--- a/images/dsBoltzmannMachinesOverview.pptx
+++ b/images/dsBoltzmannMachinesOverview.pptx
@@ -302,7 +302,7 @@
           <a:p>
             <a:fld id="{5D1828FC-2644-49F9-9A30-4255A55091FC}" type="datetimeFigureOut">
               <a:rPr lang="de-DE" smtClean="0"/>
-              <a:t>17.03.2021</a:t>
+              <a:t>01.05.2021</a:t>
             </a:fld>
             <a:endParaRPr lang="de-DE"/>
           </a:p>
@@ -470,7 +470,7 @@
           <a:p>
             <a:fld id="{5D1828FC-2644-49F9-9A30-4255A55091FC}" type="datetimeFigureOut">
               <a:rPr lang="de-DE" smtClean="0"/>
-              <a:t>17.03.2021</a:t>
+              <a:t>01.05.2021</a:t>
             </a:fld>
             <a:endParaRPr lang="de-DE"/>
           </a:p>
@@ -648,7 +648,7 @@
           <a:p>
             <a:fld id="{5D1828FC-2644-49F9-9A30-4255A55091FC}" type="datetimeFigureOut">
               <a:rPr lang="de-DE" smtClean="0"/>
-              <a:t>17.03.2021</a:t>
+              <a:t>01.05.2021</a:t>
             </a:fld>
             <a:endParaRPr lang="de-DE"/>
           </a:p>
@@ -816,7 +816,7 @@
           <a:p>
             <a:fld id="{5D1828FC-2644-49F9-9A30-4255A55091FC}" type="datetimeFigureOut">
               <a:rPr lang="de-DE" smtClean="0"/>
-              <a:t>17.03.2021</a:t>
+              <a:t>01.05.2021</a:t>
             </a:fld>
             <a:endParaRPr lang="de-DE"/>
           </a:p>
@@ -1061,7 +1061,7 @@
           <a:p>
             <a:fld id="{5D1828FC-2644-49F9-9A30-4255A55091FC}" type="datetimeFigureOut">
               <a:rPr lang="de-DE" smtClean="0"/>
-              <a:t>17.03.2021</a:t>
+              <a:t>01.05.2021</a:t>
             </a:fld>
             <a:endParaRPr lang="de-DE"/>
           </a:p>
@@ -1346,7 +1346,7 @@
           <a:p>
             <a:fld id="{5D1828FC-2644-49F9-9A30-4255A55091FC}" type="datetimeFigureOut">
               <a:rPr lang="de-DE" smtClean="0"/>
-              <a:t>17.03.2021</a:t>
+              <a:t>01.05.2021</a:t>
             </a:fld>
             <a:endParaRPr lang="de-DE"/>
           </a:p>
@@ -1770,7 +1770,7 @@
           <a:p>
             <a:fld id="{5D1828FC-2644-49F9-9A30-4255A55091FC}" type="datetimeFigureOut">
               <a:rPr lang="de-DE" smtClean="0"/>
-              <a:t>17.03.2021</a:t>
+              <a:t>01.05.2021</a:t>
             </a:fld>
             <a:endParaRPr lang="de-DE"/>
           </a:p>
@@ -1887,7 +1887,7 @@
           <a:p>
             <a:fld id="{5D1828FC-2644-49F9-9A30-4255A55091FC}" type="datetimeFigureOut">
               <a:rPr lang="de-DE" smtClean="0"/>
-              <a:t>17.03.2021</a:t>
+              <a:t>01.05.2021</a:t>
             </a:fld>
             <a:endParaRPr lang="de-DE"/>
           </a:p>
@@ -1982,7 +1982,7 @@
           <a:p>
             <a:fld id="{5D1828FC-2644-49F9-9A30-4255A55091FC}" type="datetimeFigureOut">
               <a:rPr lang="de-DE" smtClean="0"/>
-              <a:t>17.03.2021</a:t>
+              <a:t>01.05.2021</a:t>
             </a:fld>
             <a:endParaRPr lang="de-DE"/>
           </a:p>
@@ -2257,7 +2257,7 @@
           <a:p>
             <a:fld id="{5D1828FC-2644-49F9-9A30-4255A55091FC}" type="datetimeFigureOut">
               <a:rPr lang="de-DE" smtClean="0"/>
-              <a:t>17.03.2021</a:t>
+              <a:t>01.05.2021</a:t>
             </a:fld>
             <a:endParaRPr lang="de-DE"/>
           </a:p>
@@ -2509,7 +2509,7 @@
           <a:p>
             <a:fld id="{5D1828FC-2644-49F9-9A30-4255A55091FC}" type="datetimeFigureOut">
               <a:rPr lang="de-DE" smtClean="0"/>
-              <a:t>17.03.2021</a:t>
+              <a:t>01.05.2021</a:t>
             </a:fld>
             <a:endParaRPr lang="de-DE"/>
           </a:p>
@@ -2720,7 +2720,7 @@
           <a:p>
             <a:fld id="{5D1828FC-2644-49F9-9A30-4255A55091FC}" type="datetimeFigureOut">
               <a:rPr lang="de-DE" smtClean="0"/>
-              <a:t>17.03.2021</a:t>
+              <a:t>01.05.2021</a:t>
             </a:fld>
             <a:endParaRPr lang="de-DE"/>
           </a:p>
@@ -4217,8 +4217,8 @@
         </p:nvSpPr>
         <p:spPr>
           <a:xfrm>
-            <a:off x="5866533" y="5428789"/>
-            <a:ext cx="397224" cy="340870"/>
+            <a:off x="5472509" y="5400327"/>
+            <a:ext cx="314453" cy="340870"/>
           </a:xfrm>
           <a:prstGeom prst="rect">
             <a:avLst/>
@@ -4263,8 +4263,8 @@
         </p:nvSpPr>
         <p:spPr>
           <a:xfrm>
-            <a:off x="6263757" y="5400327"/>
-            <a:ext cx="2357750" cy="369332"/>
+            <a:off x="5869733" y="5371865"/>
+            <a:ext cx="2907838" cy="369332"/>
           </a:xfrm>
           <a:prstGeom prst="rect">
             <a:avLst/>
@@ -4279,7 +4279,15 @@
           <a:p>
             <a:r>
               <a:rPr lang="de-DE" dirty="0" err="1"/>
-              <a:t>Developed</a:t>
+              <a:t>Newly</a:t>
+            </a:r>
+            <a:r>
+              <a:rPr lang="de-DE" dirty="0"/>
+              <a:t> </a:t>
+            </a:r>
+            <a:r>
+              <a:rPr lang="de-DE" dirty="0" err="1"/>
+              <a:t>developed</a:t>
             </a:r>
             <a:r>
               <a:rPr lang="de-DE" dirty="0"/>
@@ -4307,8 +4315,8 @@
         </p:nvSpPr>
         <p:spPr>
           <a:xfrm>
-            <a:off x="5866534" y="5894167"/>
-            <a:ext cx="397223" cy="323543"/>
+            <a:off x="5472511" y="5865705"/>
+            <a:ext cx="314452" cy="323543"/>
           </a:xfrm>
           <a:prstGeom prst="rect">
             <a:avLst/>
@@ -4358,8 +4366,8 @@
         </p:nvSpPr>
         <p:spPr>
           <a:xfrm>
-            <a:off x="6263186" y="5874133"/>
-            <a:ext cx="2147618" cy="369332"/>
+            <a:off x="5869161" y="5845671"/>
+            <a:ext cx="2123627" cy="369332"/>
           </a:xfrm>
           <a:prstGeom prst="rect">
             <a:avLst/>

</xml_diff>